<commit_message>
Added in 1 slide for stimuli folder
</commit_message>
<xml_diff>
--- a/Stimuli/new/General instructions.pptx
+++ b/Stimuli/new/General instructions.pptx
@@ -17,14 +17,17 @@
     <p:sldId id="266" r:id="rId11"/>
     <p:sldId id="267" r:id="rId12"/>
     <p:sldId id="268" r:id="rId13"/>
-    <p:sldId id="270" r:id="rId14"/>
-    <p:sldId id="269" r:id="rId15"/>
-    <p:sldId id="271" r:id="rId16"/>
-    <p:sldId id="273" r:id="rId17"/>
-    <p:sldId id="275" r:id="rId18"/>
-    <p:sldId id="278" r:id="rId19"/>
-    <p:sldId id="279" r:id="rId20"/>
-    <p:sldId id="280" r:id="rId21"/>
+    <p:sldId id="283" r:id="rId14"/>
+    <p:sldId id="270" r:id="rId15"/>
+    <p:sldId id="269" r:id="rId16"/>
+    <p:sldId id="271" r:id="rId17"/>
+    <p:sldId id="273" r:id="rId18"/>
+    <p:sldId id="275" r:id="rId19"/>
+    <p:sldId id="278" r:id="rId20"/>
+    <p:sldId id="279" r:id="rId21"/>
+    <p:sldId id="280" r:id="rId22"/>
+    <p:sldId id="281" r:id="rId23"/>
+    <p:sldId id="282" r:id="rId24"/>
   </p:sldIdLst>
   <p:sldSz cx="9144000" cy="6858000" type="screen4x3"/>
   <p:notesSz cx="6858000" cy="9144000"/>
@@ -3812,8 +3815,8 @@
         </p:nvSpPr>
         <p:spPr>
           <a:xfrm>
-            <a:off x="218553" y="2608410"/>
-            <a:ext cx="8720667" cy="1477328"/>
+            <a:off x="254001" y="2887472"/>
+            <a:ext cx="8720667" cy="1015663"/>
           </a:xfrm>
           <a:prstGeom prst="rect">
             <a:avLst/>
@@ -3826,55 +3829,39 @@
           <a:lstStyle/>
           <a:p>
             <a:r>
+              <a:rPr lang="en-US" sz="3000" dirty="0" smtClean="0">
+                <a:latin typeface="Times"/>
+                <a:cs typeface="Times"/>
+              </a:rPr>
+              <a:t>Practice </a:t>
+            </a:r>
+            <a:r>
               <a:rPr lang="en-US" sz="3000" dirty="0">
                 <a:latin typeface="Times"/>
                 <a:cs typeface="Times"/>
               </a:rPr>
-              <a:t>Practice Session 2 has now </a:t>
+              <a:t>Session </a:t>
             </a:r>
             <a:r>
               <a:rPr lang="en-US" sz="3000" dirty="0" smtClean="0">
                 <a:latin typeface="Times"/>
                 <a:cs typeface="Times"/>
               </a:rPr>
-              <a:t>ended.</a:t>
+              <a:t>2 </a:t>
             </a:r>
             <a:r>
               <a:rPr lang="en-US" sz="3000" dirty="0">
                 <a:latin typeface="Times"/>
                 <a:cs typeface="Times"/>
               </a:rPr>
-              <a:t> </a:t>
+              <a:t>has now ended. </a:t>
             </a:r>
             <a:r>
               <a:rPr lang="en-US" sz="3000" dirty="0" smtClean="0">
                 <a:latin typeface="Times"/>
                 <a:cs typeface="Times"/>
               </a:rPr>
-              <a:t>Please </a:t>
-            </a:r>
-            <a:r>
-              <a:rPr lang="en-US" sz="3000" dirty="0">
-                <a:latin typeface="Times"/>
-                <a:cs typeface="Times"/>
-              </a:rPr>
-              <a:t>inform the experimenter if you have any questions about the task.</a:t>
-            </a:r>
-          </a:p>
-          <a:p>
-            <a:r>
-              <a:rPr lang="en-US" sz="3000" dirty="0">
-                <a:latin typeface="Times"/>
-                <a:cs typeface="Times"/>
-              </a:rPr>
-              <a:t> </a:t>
-            </a:r>
-            <a:r>
-              <a:rPr lang="en-US" sz="3000" b="1" dirty="0">
-                <a:latin typeface="Times"/>
-                <a:cs typeface="Times"/>
-              </a:rPr>
-              <a:t> </a:t>
+              <a:t>Please wait for the experimenter before continuing. </a:t>
             </a:r>
             <a:endParaRPr lang="en-US" sz="3000" dirty="0">
               <a:latin typeface="Times"/>
@@ -3922,7 +3909,7 @@
     </p:spTree>
     <p:extLst>
       <p:ext uri="{BB962C8B-B14F-4D97-AF65-F5344CB8AC3E}">
-        <p14:creationId xmlns:p14="http://schemas.microsoft.com/office/powerpoint/2010/main" val="3443080384"/>
+        <p14:creationId xmlns:p14="http://schemas.microsoft.com/office/powerpoint/2010/main" val="2199237959"/>
       </p:ext>
     </p:extLst>
   </p:cSld>
@@ -3957,8 +3944,8 @@
         </p:nvSpPr>
         <p:spPr>
           <a:xfrm>
-            <a:off x="218553" y="178138"/>
-            <a:ext cx="8720667" cy="6093976"/>
+            <a:off x="218553" y="2608410"/>
+            <a:ext cx="8720667" cy="1477328"/>
           </a:xfrm>
           <a:prstGeom prst="rect">
             <a:avLst/>
@@ -3971,58 +3958,55 @@
           <a:lstStyle/>
           <a:p>
             <a:r>
+              <a:rPr lang="en-US" sz="3000" dirty="0">
+                <a:latin typeface="Times"/>
+                <a:cs typeface="Times"/>
+              </a:rPr>
+              <a:t>Practice Session 2 has now </a:t>
+            </a:r>
+            <a:r>
               <a:rPr lang="en-US" sz="3000" dirty="0" smtClean="0">
                 <a:latin typeface="Times"/>
                 <a:cs typeface="Times"/>
               </a:rPr>
-              <a:t>When </a:t>
+              <a:t>ended.</a:t>
             </a:r>
             <a:r>
               <a:rPr lang="en-US" sz="3000" dirty="0">
                 <a:latin typeface="Times"/>
                 <a:cs typeface="Times"/>
               </a:rPr>
-              <a:t>you are ready, we will begin the task. There will be a total of 286 trials with several breaks along the way. Again, you may quit the experiment at any point by pressing the middle foot pedal during a green cross screen. </a:t>
-            </a:r>
-          </a:p>
-          <a:p>
+              <a:t> </a:t>
+            </a:r>
+            <a:r>
+              <a:rPr lang="en-US" sz="3000" dirty="0" smtClean="0">
+                <a:latin typeface="Times"/>
+                <a:cs typeface="Times"/>
+              </a:rPr>
+              <a:t>Please </a:t>
+            </a:r>
             <a:r>
               <a:rPr lang="en-US" sz="3000" dirty="0">
                 <a:latin typeface="Times"/>
                 <a:cs typeface="Times"/>
               </a:rPr>
+              <a:t>inform the experimenter if you have any questions about the task.</a:t>
+            </a:r>
+          </a:p>
+          <a:p>
+            <a:r>
+              <a:rPr lang="en-US" sz="3000" dirty="0">
+                <a:latin typeface="Times"/>
+                <a:cs typeface="Times"/>
+              </a:rPr>
               <a:t> </a:t>
             </a:r>
-          </a:p>
-          <a:p>
-            <a:r>
-              <a:rPr lang="en-US" sz="3000" dirty="0">
-                <a:latin typeface="Times"/>
-                <a:cs typeface="Times"/>
-              </a:rPr>
-              <a:t>Please remember to do your best to blink only during the green cross and not during the arrows. Please also remember to sit as still as possible without moving your arms and legs while the task is in progress. </a:t>
-            </a:r>
-          </a:p>
-          <a:p>
-            <a:r>
-              <a:rPr lang="en-US" sz="3000" dirty="0">
+            <a:r>
+              <a:rPr lang="en-US" sz="3000" b="1" dirty="0">
                 <a:latin typeface="Times"/>
                 <a:cs typeface="Times"/>
               </a:rPr>
               <a:t> </a:t>
-            </a:r>
-            <a:endParaRPr lang="en-US" sz="3000" dirty="0" smtClean="0">
-              <a:latin typeface="Times"/>
-              <a:cs typeface="Times"/>
-            </a:endParaRPr>
-          </a:p>
-          <a:p>
-            <a:r>
-              <a:rPr lang="en-US" sz="3000" dirty="0" smtClean="0">
-                <a:latin typeface="Times"/>
-                <a:cs typeface="Times"/>
-              </a:rPr>
-              <a:t>Press the left foot pedal when you are ready to begin the task…</a:t>
             </a:r>
             <a:endParaRPr lang="en-US" sz="3000" dirty="0">
               <a:latin typeface="Times"/>
@@ -4031,10 +4015,46 @@
           </a:p>
         </p:txBody>
       </p:sp>
+      <p:sp>
+        <p:nvSpPr>
+          <p:cNvPr id="3" name="TextBox 2"/>
+          <p:cNvSpPr txBox="1"/>
+          <p:nvPr/>
+        </p:nvSpPr>
+        <p:spPr>
+          <a:xfrm>
+            <a:off x="254001" y="6163738"/>
+            <a:ext cx="6018219" cy="553998"/>
+          </a:xfrm>
+          <a:prstGeom prst="rect">
+            <a:avLst/>
+          </a:prstGeom>
+          <a:noFill/>
+        </p:spPr>
+        <p:txBody>
+          <a:bodyPr wrap="none" rtlCol="0">
+            <a:spAutoFit/>
+          </a:bodyPr>
+          <a:lstStyle/>
+          <a:p>
+            <a:r>
+              <a:rPr lang="en-US" sz="3000" dirty="0" smtClean="0">
+                <a:latin typeface="Times"/>
+                <a:cs typeface="Times"/>
+              </a:rPr>
+              <a:t>Press the left foot pedal to continue…</a:t>
+            </a:r>
+            <a:endParaRPr lang="en-US" sz="3000" dirty="0">
+              <a:latin typeface="Times"/>
+              <a:cs typeface="Times"/>
+            </a:endParaRPr>
+          </a:p>
+        </p:txBody>
+      </p:sp>
     </p:spTree>
     <p:extLst>
       <p:ext uri="{BB962C8B-B14F-4D97-AF65-F5344CB8AC3E}">
-        <p14:creationId xmlns:p14="http://schemas.microsoft.com/office/powerpoint/2010/main" val="4045912075"/>
+        <p14:creationId xmlns:p14="http://schemas.microsoft.com/office/powerpoint/2010/main" val="3443080384"/>
       </p:ext>
     </p:extLst>
   </p:cSld>
@@ -4070,7 +4090,7 @@
         <p:spPr>
           <a:xfrm>
             <a:off x="218553" y="178138"/>
-            <a:ext cx="8720667" cy="5632311"/>
+            <a:ext cx="8720667" cy="6093976"/>
           </a:xfrm>
           <a:prstGeom prst="rect">
             <a:avLst/>
@@ -4087,64 +4107,66 @@
                 <a:latin typeface="Times"/>
                 <a:cs typeface="Times"/>
               </a:rPr>
-              <a:t>You will now have a 60 second break in the task. </a:t>
-            </a:r>
-          </a:p>
-          <a:p>
+              <a:t>When </a:t>
+            </a:r>
+            <a:r>
+              <a:rPr lang="en-US" sz="3000" dirty="0">
+                <a:latin typeface="Times"/>
+                <a:cs typeface="Times"/>
+              </a:rPr>
+              <a:t>you are ready, we will begin the task. There will be a total of 286 trials with several breaks along the way. Again, you may quit the experiment at any point by pressing the middle foot pedal during a green cross screen. </a:t>
+            </a:r>
+          </a:p>
+          <a:p>
+            <a:r>
+              <a:rPr lang="en-US" sz="3000" dirty="0">
+                <a:latin typeface="Times"/>
+                <a:cs typeface="Times"/>
+              </a:rPr>
+              <a:t> </a:t>
+            </a:r>
+          </a:p>
+          <a:p>
+            <a:r>
+              <a:rPr lang="en-US" sz="3000" dirty="0">
+                <a:latin typeface="Times"/>
+                <a:cs typeface="Times"/>
+              </a:rPr>
+              <a:t>Please remember to do your best to blink only during the green cross and not during the arrows. Please also remember to sit as still as possible without moving your arms and legs while the task is in progress. </a:t>
+            </a:r>
+          </a:p>
+          <a:p>
+            <a:r>
+              <a:rPr lang="en-US" sz="3000" dirty="0">
+                <a:latin typeface="Times"/>
+                <a:cs typeface="Times"/>
+              </a:rPr>
+              <a:t> </a:t>
+            </a:r>
+            <a:endParaRPr lang="en-US" sz="3000" dirty="0" smtClean="0">
+              <a:latin typeface="Times"/>
+              <a:cs typeface="Times"/>
+            </a:endParaRPr>
+          </a:p>
+          <a:p>
+            <a:r>
+              <a:rPr lang="en-US" sz="3000" dirty="0" smtClean="0">
+                <a:latin typeface="Times"/>
+                <a:cs typeface="Times"/>
+              </a:rPr>
+              <a:t>Press the left foot pedal when you are ready to begin the task…</a:t>
+            </a:r>
             <a:endParaRPr lang="en-US" sz="3000" dirty="0">
               <a:latin typeface="Times"/>
               <a:cs typeface="Times"/>
             </a:endParaRPr>
           </a:p>
-          <a:p>
-            <a:r>
-              <a:rPr lang="en-US" sz="3000" dirty="0" smtClean="0">
-                <a:latin typeface="Times"/>
-                <a:cs typeface="Times"/>
-              </a:rPr>
-              <a:t>Please still try to remain still without moving very much, as it can disrupt the sensors on the EEG cap, but feel free to make small adjustments in your posture to be more comfortable.  </a:t>
-            </a:r>
-          </a:p>
-          <a:p>
-            <a:endParaRPr lang="en-US" sz="3000" dirty="0">
-              <a:latin typeface="Times"/>
-              <a:cs typeface="Times"/>
-            </a:endParaRPr>
-          </a:p>
-          <a:p>
-            <a:r>
-              <a:rPr lang="en-US" sz="3000" dirty="0" smtClean="0">
-                <a:latin typeface="Times"/>
-                <a:cs typeface="Times"/>
-              </a:rPr>
-              <a:t>Another screen will alert you when you have 10 seconds remaining. </a:t>
-            </a:r>
-          </a:p>
-          <a:p>
-            <a:endParaRPr lang="en-US" sz="3000" dirty="0">
-              <a:latin typeface="Times"/>
-              <a:cs typeface="Times"/>
-            </a:endParaRPr>
-          </a:p>
-          <a:p>
-            <a:r>
-              <a:rPr lang="en-US" sz="3000" dirty="0" smtClean="0">
-                <a:latin typeface="Times"/>
-                <a:cs typeface="Times"/>
-              </a:rPr>
-              <a:t>If you would like to continue with the task before the break is over, press the left foot pedal…</a:t>
-            </a:r>
-            <a:endParaRPr lang="en-US" sz="3000" dirty="0">
-              <a:latin typeface="Times"/>
-              <a:cs typeface="Times"/>
-            </a:endParaRPr>
-          </a:p>
         </p:txBody>
       </p:sp>
     </p:spTree>
     <p:extLst>
       <p:ext uri="{BB962C8B-B14F-4D97-AF65-F5344CB8AC3E}">
-        <p14:creationId xmlns:p14="http://schemas.microsoft.com/office/powerpoint/2010/main" val="2349642309"/>
+        <p14:creationId xmlns:p14="http://schemas.microsoft.com/office/powerpoint/2010/main" val="4045912075"/>
       </p:ext>
     </p:extLst>
   </p:cSld>
@@ -4179,8 +4201,8 @@
         </p:nvSpPr>
         <p:spPr>
           <a:xfrm>
-            <a:off x="218553" y="2921337"/>
-            <a:ext cx="8720667" cy="1477328"/>
+            <a:off x="218553" y="178138"/>
+            <a:ext cx="8720667" cy="5632311"/>
           </a:xfrm>
           <a:prstGeom prst="rect">
             <a:avLst/>
@@ -4197,7 +4219,7 @@
                 <a:latin typeface="Times"/>
                 <a:cs typeface="Times"/>
               </a:rPr>
-              <a:t>You have 10 seconds remaining in the break. The task will resume automatically… </a:t>
+              <a:t>You will now have a 60 second break in the task. </a:t>
             </a:r>
           </a:p>
           <a:p>
@@ -4206,12 +4228,55 @@
               <a:cs typeface="Times"/>
             </a:endParaRPr>
           </a:p>
+          <a:p>
+            <a:r>
+              <a:rPr lang="en-US" sz="3000" dirty="0" smtClean="0">
+                <a:latin typeface="Times"/>
+                <a:cs typeface="Times"/>
+              </a:rPr>
+              <a:t>Please still try to remain still without moving very much, as it can disrupt the sensors on the EEG cap, but feel free to make small adjustments in your posture to be more comfortable.  </a:t>
+            </a:r>
+          </a:p>
+          <a:p>
+            <a:endParaRPr lang="en-US" sz="3000" dirty="0">
+              <a:latin typeface="Times"/>
+              <a:cs typeface="Times"/>
+            </a:endParaRPr>
+          </a:p>
+          <a:p>
+            <a:r>
+              <a:rPr lang="en-US" sz="3000" dirty="0" smtClean="0">
+                <a:latin typeface="Times"/>
+                <a:cs typeface="Times"/>
+              </a:rPr>
+              <a:t>Another screen will alert you when you have 10 seconds remaining. </a:t>
+            </a:r>
+          </a:p>
+          <a:p>
+            <a:endParaRPr lang="en-US" sz="3000" dirty="0">
+              <a:latin typeface="Times"/>
+              <a:cs typeface="Times"/>
+            </a:endParaRPr>
+          </a:p>
+          <a:p>
+            <a:r>
+              <a:rPr lang="en-US" sz="3000" dirty="0" smtClean="0">
+                <a:latin typeface="Times"/>
+                <a:cs typeface="Times"/>
+              </a:rPr>
+              <a:t>If you would like to continue with the task before the break is over, press the left foot pedal…</a:t>
+            </a:r>
+            <a:endParaRPr lang="en-US" sz="3000" dirty="0">
+              <a:latin typeface="Times"/>
+              <a:cs typeface="Times"/>
+            </a:endParaRPr>
+          </a:p>
         </p:txBody>
       </p:sp>
     </p:spTree>
     <p:extLst>
       <p:ext uri="{BB962C8B-B14F-4D97-AF65-F5344CB8AC3E}">
-        <p14:creationId xmlns:p14="http://schemas.microsoft.com/office/powerpoint/2010/main" val="3540041129"/>
+        <p14:creationId xmlns:p14="http://schemas.microsoft.com/office/powerpoint/2010/main" val="2349642309"/>
       </p:ext>
     </p:extLst>
   </p:cSld>
@@ -4246,8 +4311,8 @@
         </p:nvSpPr>
         <p:spPr>
           <a:xfrm>
-            <a:off x="218553" y="2616538"/>
-            <a:ext cx="8720667" cy="1938992"/>
+            <a:off x="218553" y="2921337"/>
+            <a:ext cx="8720667" cy="1477328"/>
           </a:xfrm>
           <a:prstGeom prst="rect">
             <a:avLst/>
@@ -4264,7 +4329,7 @@
                 <a:latin typeface="Times"/>
                 <a:cs typeface="Times"/>
               </a:rPr>
-              <a:t>You have completed the experimental session. Thank you for your time. Please let the experimenters know you are finished. </a:t>
+              <a:t>You have 10 seconds remaining in the break. The task will resume automatically… </a:t>
             </a:r>
           </a:p>
           <a:p>
@@ -4278,7 +4343,7 @@
     </p:spTree>
     <p:extLst>
       <p:ext uri="{BB962C8B-B14F-4D97-AF65-F5344CB8AC3E}">
-        <p14:creationId xmlns:p14="http://schemas.microsoft.com/office/powerpoint/2010/main" val="2780430357"/>
+        <p14:creationId xmlns:p14="http://schemas.microsoft.com/office/powerpoint/2010/main" val="3540041129"/>
       </p:ext>
     </p:extLst>
   </p:cSld>
@@ -4307,54 +4372,45 @@
       </p:grpSpPr>
       <p:sp>
         <p:nvSpPr>
-          <p:cNvPr id="4" name="Left Arrow 3"/>
-          <p:cNvSpPr>
-            <a:spLocks noChangeAspect="1"/>
-          </p:cNvSpPr>
+          <p:cNvPr id="4" name="Rectangle 3"/>
+          <p:cNvSpPr/>
           <p:nvPr/>
         </p:nvSpPr>
         <p:spPr>
           <a:xfrm>
-            <a:off x="3014133" y="2556911"/>
-            <a:ext cx="3123880" cy="1920239"/>
-          </a:xfrm>
-          <a:prstGeom prst="leftArrow">
-            <a:avLst>
-              <a:gd name="adj1" fmla="val 44030"/>
-              <a:gd name="adj2" fmla="val 50000"/>
-            </a:avLst>
+            <a:off x="218553" y="2616538"/>
+            <a:ext cx="8720667" cy="1938992"/>
+          </a:xfrm>
+          <a:prstGeom prst="rect">
+            <a:avLst/>
           </a:prstGeom>
-          <a:solidFill>
-            <a:srgbClr val="3366FF"/>
-          </a:solidFill>
-        </p:spPr>
-        <p:style>
-          <a:lnRef idx="1">
-            <a:schemeClr val="accent1"/>
-          </a:lnRef>
-          <a:fillRef idx="3">
-            <a:schemeClr val="accent1"/>
-          </a:fillRef>
-          <a:effectRef idx="2">
-            <a:schemeClr val="accent1"/>
-          </a:effectRef>
-          <a:fontRef idx="minor">
-            <a:schemeClr val="lt1"/>
-          </a:fontRef>
-        </p:style>
-        <p:txBody>
-          <a:bodyPr rtlCol="0" anchor="ctr"/>
-          <a:lstStyle/>
-          <a:p>
-            <a:pPr algn="ctr"/>
-            <a:endParaRPr lang="en-US"/>
+        </p:spPr>
+        <p:txBody>
+          <a:bodyPr wrap="square">
+            <a:spAutoFit/>
+          </a:bodyPr>
+          <a:lstStyle/>
+          <a:p>
+            <a:r>
+              <a:rPr lang="en-US" sz="3000" dirty="0" smtClean="0">
+                <a:latin typeface="Times"/>
+                <a:cs typeface="Times"/>
+              </a:rPr>
+              <a:t>You have completed the experimental session. Thank you for your time. Please let the experimenters know you are finished. </a:t>
+            </a:r>
+          </a:p>
+          <a:p>
+            <a:endParaRPr lang="en-US" sz="3000" dirty="0">
+              <a:latin typeface="Times"/>
+              <a:cs typeface="Times"/>
+            </a:endParaRPr>
           </a:p>
         </p:txBody>
       </p:sp>
     </p:spTree>
     <p:extLst>
       <p:ext uri="{BB962C8B-B14F-4D97-AF65-F5344CB8AC3E}">
-        <p14:creationId xmlns:p14="http://schemas.microsoft.com/office/powerpoint/2010/main" val="3673762320"/>
+        <p14:creationId xmlns:p14="http://schemas.microsoft.com/office/powerpoint/2010/main" val="2780430357"/>
       </p:ext>
     </p:extLst>
   </p:cSld>
@@ -4390,7 +4446,7 @@
           <p:nvPr/>
         </p:nvSpPr>
         <p:spPr>
-          <a:xfrm flipH="1">
+          <a:xfrm>
             <a:off x="3014133" y="2556911"/>
             <a:ext cx="3123880" cy="1920239"/>
           </a:xfrm>
@@ -4430,7 +4486,7 @@
     </p:spTree>
     <p:extLst>
       <p:ext uri="{BB962C8B-B14F-4D97-AF65-F5344CB8AC3E}">
-        <p14:creationId xmlns:p14="http://schemas.microsoft.com/office/powerpoint/2010/main" val="3171410442"/>
+        <p14:creationId xmlns:p14="http://schemas.microsoft.com/office/powerpoint/2010/main" val="3673762320"/>
       </p:ext>
     </p:extLst>
   </p:cSld>
@@ -4698,30 +4754,26 @@
       </p:grpSpPr>
       <p:sp>
         <p:nvSpPr>
-          <p:cNvPr id="3" name="Plus 2"/>
+          <p:cNvPr id="4" name="Left Arrow 3"/>
           <p:cNvSpPr>
             <a:spLocks noChangeAspect="1"/>
           </p:cNvSpPr>
           <p:nvPr/>
         </p:nvSpPr>
         <p:spPr>
-          <a:xfrm>
-            <a:off x="3522139" y="2462113"/>
-            <a:ext cx="2084161" cy="1920239"/>
-          </a:xfrm>
-          <a:prstGeom prst="mathPlus">
+          <a:xfrm flipH="1">
+            <a:off x="3014133" y="2556911"/>
+            <a:ext cx="3123880" cy="1920239"/>
+          </a:xfrm>
+          <a:prstGeom prst="leftArrow">
             <a:avLst>
-              <a:gd name="adj1" fmla="val 9630"/>
+              <a:gd name="adj1" fmla="val 44030"/>
+              <a:gd name="adj2" fmla="val 50000"/>
             </a:avLst>
           </a:prstGeom>
           <a:solidFill>
-            <a:srgbClr val="008000"/>
+            <a:srgbClr val="3366FF"/>
           </a:solidFill>
-          <a:ln>
-            <a:solidFill>
-              <a:schemeClr val="bg1"/>
-            </a:solidFill>
-          </a:ln>
         </p:spPr>
         <p:style>
           <a:lnRef idx="1">
@@ -4742,6 +4794,86 @@
           <a:lstStyle/>
           <a:p>
             <a:pPr algn="ctr"/>
+            <a:endParaRPr lang="en-US"/>
+          </a:p>
+        </p:txBody>
+      </p:sp>
+    </p:spTree>
+    <p:extLst>
+      <p:ext uri="{BB962C8B-B14F-4D97-AF65-F5344CB8AC3E}">
+        <p14:creationId xmlns:p14="http://schemas.microsoft.com/office/powerpoint/2010/main" val="3171410442"/>
+      </p:ext>
+    </p:extLst>
+  </p:cSld>
+  <p:clrMapOvr>
+    <a:masterClrMapping/>
+  </p:clrMapOvr>
+</p:sld>
+</file>
+
+<file path=ppt/slides/slide21.xml><?xml version="1.0" encoding="utf-8"?>
+<p:sld xmlns:a="http://schemas.openxmlformats.org/drawingml/2006/main" xmlns:r="http://schemas.openxmlformats.org/officeDocument/2006/relationships" xmlns:p="http://schemas.openxmlformats.org/presentationml/2006/main">
+  <p:cSld>
+    <p:spTree>
+      <p:nvGrpSpPr>
+        <p:cNvPr id="1" name=""/>
+        <p:cNvGrpSpPr/>
+        <p:nvPr/>
+      </p:nvGrpSpPr>
+      <p:grpSpPr>
+        <a:xfrm>
+          <a:off x="0" y="0"/>
+          <a:ext cx="0" cy="0"/>
+          <a:chOff x="0" y="0"/>
+          <a:chExt cx="0" cy="0"/>
+        </a:xfrm>
+      </p:grpSpPr>
+      <p:sp>
+        <p:nvSpPr>
+          <p:cNvPr id="3" name="Plus 2"/>
+          <p:cNvSpPr>
+            <a:spLocks noChangeAspect="1"/>
+          </p:cNvSpPr>
+          <p:nvPr/>
+        </p:nvSpPr>
+        <p:spPr>
+          <a:xfrm>
+            <a:off x="3522139" y="2462113"/>
+            <a:ext cx="2084161" cy="1920239"/>
+          </a:xfrm>
+          <a:prstGeom prst="mathPlus">
+            <a:avLst>
+              <a:gd name="adj1" fmla="val 9630"/>
+            </a:avLst>
+          </a:prstGeom>
+          <a:solidFill>
+            <a:srgbClr val="008000"/>
+          </a:solidFill>
+          <a:ln>
+            <a:solidFill>
+              <a:schemeClr val="bg1"/>
+            </a:solidFill>
+          </a:ln>
+        </p:spPr>
+        <p:style>
+          <a:lnRef idx="1">
+            <a:schemeClr val="accent1"/>
+          </a:lnRef>
+          <a:fillRef idx="3">
+            <a:schemeClr val="accent1"/>
+          </a:fillRef>
+          <a:effectRef idx="2">
+            <a:schemeClr val="accent1"/>
+          </a:effectRef>
+          <a:fontRef idx="minor">
+            <a:schemeClr val="lt1"/>
+          </a:fontRef>
+        </p:style>
+        <p:txBody>
+          <a:bodyPr rtlCol="0" anchor="ctr"/>
+          <a:lstStyle/>
+          <a:p>
+            <a:pPr algn="ctr"/>
             <a:endParaRPr lang="en-US" dirty="0">
               <a:ln>
                 <a:solidFill>
@@ -4759,6 +4891,184 @@
     <p:extLst>
       <p:ext uri="{BB962C8B-B14F-4D97-AF65-F5344CB8AC3E}">
         <p14:creationId xmlns:p14="http://schemas.microsoft.com/office/powerpoint/2010/main" val="1570306117"/>
+      </p:ext>
+    </p:extLst>
+  </p:cSld>
+  <p:clrMapOvr>
+    <a:masterClrMapping/>
+  </p:clrMapOvr>
+</p:sld>
+</file>
+
+<file path=ppt/slides/slide22.xml><?xml version="1.0" encoding="utf-8"?>
+<p:sld xmlns:a="http://schemas.openxmlformats.org/drawingml/2006/main" xmlns:r="http://schemas.openxmlformats.org/officeDocument/2006/relationships" xmlns:p="http://schemas.openxmlformats.org/presentationml/2006/main">
+  <p:cSld>
+    <p:spTree>
+      <p:nvGrpSpPr>
+        <p:cNvPr id="1" name=""/>
+        <p:cNvGrpSpPr/>
+        <p:nvPr/>
+      </p:nvGrpSpPr>
+      <p:grpSpPr>
+        <a:xfrm>
+          <a:off x="0" y="0"/>
+          <a:ext cx="0" cy="0"/>
+          <a:chOff x="0" y="0"/>
+          <a:chExt cx="0" cy="0"/>
+        </a:xfrm>
+      </p:grpSpPr>
+      <p:sp>
+        <p:nvSpPr>
+          <p:cNvPr id="3" name="Plus 2"/>
+          <p:cNvSpPr>
+            <a:spLocks noChangeAspect="1"/>
+          </p:cNvSpPr>
+          <p:nvPr/>
+        </p:nvSpPr>
+        <p:spPr>
+          <a:xfrm>
+            <a:off x="3522139" y="2462113"/>
+            <a:ext cx="2084161" cy="1920239"/>
+          </a:xfrm>
+          <a:prstGeom prst="mathPlus">
+            <a:avLst>
+              <a:gd name="adj1" fmla="val 9630"/>
+            </a:avLst>
+          </a:prstGeom>
+          <a:solidFill>
+            <a:schemeClr val="tx1"/>
+          </a:solidFill>
+          <a:ln>
+            <a:solidFill>
+              <a:schemeClr val="bg1"/>
+            </a:solidFill>
+          </a:ln>
+        </p:spPr>
+        <p:style>
+          <a:lnRef idx="1">
+            <a:schemeClr val="accent1"/>
+          </a:lnRef>
+          <a:fillRef idx="3">
+            <a:schemeClr val="accent1"/>
+          </a:fillRef>
+          <a:effectRef idx="2">
+            <a:schemeClr val="accent1"/>
+          </a:effectRef>
+          <a:fontRef idx="minor">
+            <a:schemeClr val="lt1"/>
+          </a:fontRef>
+        </p:style>
+        <p:txBody>
+          <a:bodyPr rtlCol="0" anchor="ctr"/>
+          <a:lstStyle/>
+          <a:p>
+            <a:pPr algn="ctr"/>
+            <a:endParaRPr lang="en-US" dirty="0">
+              <a:ln>
+                <a:solidFill>
+                  <a:schemeClr val="tx1"/>
+                </a:solidFill>
+              </a:ln>
+              <a:solidFill>
+                <a:srgbClr val="008000"/>
+              </a:solidFill>
+            </a:endParaRPr>
+          </a:p>
+        </p:txBody>
+      </p:sp>
+    </p:spTree>
+    <p:extLst>
+      <p:ext uri="{BB962C8B-B14F-4D97-AF65-F5344CB8AC3E}">
+        <p14:creationId xmlns:p14="http://schemas.microsoft.com/office/powerpoint/2010/main" val="3145945814"/>
+      </p:ext>
+    </p:extLst>
+  </p:cSld>
+  <p:clrMapOvr>
+    <a:masterClrMapping/>
+  </p:clrMapOvr>
+</p:sld>
+</file>
+
+<file path=ppt/slides/slide23.xml><?xml version="1.0" encoding="utf-8"?>
+<p:sld xmlns:a="http://schemas.openxmlformats.org/drawingml/2006/main" xmlns:r="http://schemas.openxmlformats.org/officeDocument/2006/relationships" xmlns:p="http://schemas.openxmlformats.org/presentationml/2006/main">
+  <p:cSld>
+    <p:spTree>
+      <p:nvGrpSpPr>
+        <p:cNvPr id="1" name=""/>
+        <p:cNvGrpSpPr/>
+        <p:nvPr/>
+      </p:nvGrpSpPr>
+      <p:grpSpPr>
+        <a:xfrm>
+          <a:off x="0" y="0"/>
+          <a:ext cx="0" cy="0"/>
+          <a:chOff x="0" y="0"/>
+          <a:chExt cx="0" cy="0"/>
+        </a:xfrm>
+      </p:grpSpPr>
+      <p:sp>
+        <p:nvSpPr>
+          <p:cNvPr id="3" name="Plus 2"/>
+          <p:cNvSpPr>
+            <a:spLocks noChangeAspect="1"/>
+          </p:cNvSpPr>
+          <p:nvPr/>
+        </p:nvSpPr>
+        <p:spPr>
+          <a:xfrm>
+            <a:off x="3522139" y="2462113"/>
+            <a:ext cx="2084161" cy="1920239"/>
+          </a:xfrm>
+          <a:prstGeom prst="mathPlus">
+            <a:avLst>
+              <a:gd name="adj1" fmla="val 9630"/>
+            </a:avLst>
+          </a:prstGeom>
+          <a:solidFill>
+            <a:srgbClr val="FF0000"/>
+          </a:solidFill>
+          <a:ln>
+            <a:solidFill>
+              <a:schemeClr val="bg1"/>
+            </a:solidFill>
+          </a:ln>
+        </p:spPr>
+        <p:style>
+          <a:lnRef idx="1">
+            <a:schemeClr val="accent1"/>
+          </a:lnRef>
+          <a:fillRef idx="3">
+            <a:schemeClr val="accent1"/>
+          </a:fillRef>
+          <a:effectRef idx="2">
+            <a:schemeClr val="accent1"/>
+          </a:effectRef>
+          <a:fontRef idx="minor">
+            <a:schemeClr val="lt1"/>
+          </a:fontRef>
+        </p:style>
+        <p:txBody>
+          <a:bodyPr rtlCol="0" anchor="ctr"/>
+          <a:lstStyle/>
+          <a:p>
+            <a:pPr algn="ctr"/>
+            <a:endParaRPr lang="en-US" dirty="0">
+              <a:ln>
+                <a:solidFill>
+                  <a:schemeClr val="tx1"/>
+                </a:solidFill>
+              </a:ln>
+              <a:solidFill>
+                <a:srgbClr val="008000"/>
+              </a:solidFill>
+            </a:endParaRPr>
+          </a:p>
+        </p:txBody>
+      </p:sp>
+    </p:spTree>
+    <p:extLst>
+      <p:ext uri="{BB962C8B-B14F-4D97-AF65-F5344CB8AC3E}">
+        <p14:creationId xmlns:p14="http://schemas.microsoft.com/office/powerpoint/2010/main" val="4003364053"/>
       </p:ext>
     </p:extLst>
   </p:cSld>

</xml_diff>

<commit_message>
Updated instructions screens in Stimuli folder
</commit_message>
<xml_diff>
--- a/Stimuli/new/General instructions.pptx
+++ b/Stimuli/new/General instructions.pptx
@@ -310,7 +310,7 @@
           <a:p>
             <a:fld id="{6BFECD78-3C8E-49F2-8FAB-59489D168ABB}" type="datetimeFigureOut">
               <a:rPr lang="en-US" smtClean="0"/>
-              <a:t>7/16/16</a:t>
+              <a:t>8/9/16</a:t>
             </a:fld>
             <a:endParaRPr lang="en-US"/>
           </a:p>
@@ -480,7 +480,7 @@
           <a:p>
             <a:fld id="{6BFECD78-3C8E-49F2-8FAB-59489D168ABB}" type="datetimeFigureOut">
               <a:rPr lang="en-US" smtClean="0"/>
-              <a:t>7/16/16</a:t>
+              <a:t>8/9/16</a:t>
             </a:fld>
             <a:endParaRPr lang="en-US"/>
           </a:p>
@@ -660,7 +660,7 @@
           <a:p>
             <a:fld id="{6BFECD78-3C8E-49F2-8FAB-59489D168ABB}" type="datetimeFigureOut">
               <a:rPr lang="en-US" smtClean="0"/>
-              <a:t>7/16/16</a:t>
+              <a:t>8/9/16</a:t>
             </a:fld>
             <a:endParaRPr lang="en-US"/>
           </a:p>
@@ -830,7 +830,7 @@
           <a:p>
             <a:fld id="{6BFECD78-3C8E-49F2-8FAB-59489D168ABB}" type="datetimeFigureOut">
               <a:rPr lang="en-US" smtClean="0"/>
-              <a:t>7/16/16</a:t>
+              <a:t>8/9/16</a:t>
             </a:fld>
             <a:endParaRPr lang="en-US"/>
           </a:p>
@@ -1076,7 +1076,7 @@
           <a:p>
             <a:fld id="{6BFECD78-3C8E-49F2-8FAB-59489D168ABB}" type="datetimeFigureOut">
               <a:rPr lang="en-US" smtClean="0"/>
-              <a:t>7/16/16</a:t>
+              <a:t>8/9/16</a:t>
             </a:fld>
             <a:endParaRPr lang="en-US"/>
           </a:p>
@@ -1364,7 +1364,7 @@
           <a:p>
             <a:fld id="{6BFECD78-3C8E-49F2-8FAB-59489D168ABB}" type="datetimeFigureOut">
               <a:rPr lang="en-US" smtClean="0"/>
-              <a:t>7/16/16</a:t>
+              <a:t>8/9/16</a:t>
             </a:fld>
             <a:endParaRPr lang="en-US"/>
           </a:p>
@@ -1786,7 +1786,7 @@
           <a:p>
             <a:fld id="{6BFECD78-3C8E-49F2-8FAB-59489D168ABB}" type="datetimeFigureOut">
               <a:rPr lang="en-US" smtClean="0"/>
-              <a:t>7/16/16</a:t>
+              <a:t>8/9/16</a:t>
             </a:fld>
             <a:endParaRPr lang="en-US"/>
           </a:p>
@@ -1904,7 +1904,7 @@
           <a:p>
             <a:fld id="{6BFECD78-3C8E-49F2-8FAB-59489D168ABB}" type="datetimeFigureOut">
               <a:rPr lang="en-US" smtClean="0"/>
-              <a:t>7/16/16</a:t>
+              <a:t>8/9/16</a:t>
             </a:fld>
             <a:endParaRPr lang="en-US"/>
           </a:p>
@@ -1999,7 +1999,7 @@
           <a:p>
             <a:fld id="{6BFECD78-3C8E-49F2-8FAB-59489D168ABB}" type="datetimeFigureOut">
               <a:rPr lang="en-US" smtClean="0"/>
-              <a:t>7/16/16</a:t>
+              <a:t>8/9/16</a:t>
             </a:fld>
             <a:endParaRPr lang="en-US"/>
           </a:p>
@@ -2276,7 +2276,7 @@
           <a:p>
             <a:fld id="{6BFECD78-3C8E-49F2-8FAB-59489D168ABB}" type="datetimeFigureOut">
               <a:rPr lang="en-US" smtClean="0"/>
-              <a:t>7/16/16</a:t>
+              <a:t>8/9/16</a:t>
             </a:fld>
             <a:endParaRPr lang="en-US"/>
           </a:p>
@@ -2533,7 +2533,7 @@
           <a:p>
             <a:fld id="{6BFECD78-3C8E-49F2-8FAB-59489D168ABB}" type="datetimeFigureOut">
               <a:rPr lang="en-US" smtClean="0"/>
-              <a:t>7/16/16</a:t>
+              <a:t>8/9/16</a:t>
             </a:fld>
             <a:endParaRPr lang="en-US"/>
           </a:p>
@@ -2746,7 +2746,7 @@
           <a:p>
             <a:fld id="{6BFECD78-3C8E-49F2-8FAB-59489D168ABB}" type="datetimeFigureOut">
               <a:rPr lang="en-US" smtClean="0"/>
-              <a:t>7/16/16</a:t>
+              <a:t>8/9/16</a:t>
             </a:fld>
             <a:endParaRPr lang="en-US"/>
           </a:p>
@@ -3129,8 +3129,8 @@
         </p:nvSpPr>
         <p:spPr>
           <a:xfrm>
-            <a:off x="304786" y="169335"/>
-            <a:ext cx="8534400" cy="5632311"/>
+            <a:off x="304786" y="186268"/>
+            <a:ext cx="8534400" cy="6555641"/>
           </a:xfrm>
           <a:prstGeom prst="rect">
             <a:avLst/>
@@ -3171,25 +3171,67 @@
               <a:t>using </a:t>
             </a:r>
             <a:r>
+              <a:rPr lang="en-US" sz="3000" dirty="0" smtClean="0">
+                <a:latin typeface="Times"/>
+                <a:cs typeface="Times"/>
+              </a:rPr>
+              <a:t>blunt </a:t>
+            </a:r>
+            <a:r>
               <a:rPr lang="en-US" sz="3000" dirty="0">
                 <a:latin typeface="Times"/>
                 <a:cs typeface="Times"/>
               </a:rPr>
-              <a:t>a </a:t>
+              <a:t>plastic </a:t>
             </a:r>
             <a:r>
               <a:rPr lang="en-US" sz="3000" dirty="0" smtClean="0">
                 <a:latin typeface="Times"/>
                 <a:cs typeface="Times"/>
               </a:rPr>
-              <a:t>blunt </a:t>
+              <a:t>screws </a:t>
             </a:r>
             <a:r>
               <a:rPr lang="en-US" sz="3000" dirty="0">
                 <a:latin typeface="Times"/>
                 <a:cs typeface="Times"/>
               </a:rPr>
-              <a:t>plastic screw that rests inside the boxes sitting in front of you.  </a:t>
+              <a:t>that </a:t>
+            </a:r>
+            <a:r>
+              <a:rPr lang="en-US" sz="3000" dirty="0" smtClean="0">
+                <a:latin typeface="Times"/>
+                <a:cs typeface="Times"/>
+              </a:rPr>
+              <a:t>rest </a:t>
+            </a:r>
+            <a:r>
+              <a:rPr lang="en-US" sz="3000" dirty="0">
+                <a:latin typeface="Times"/>
+                <a:cs typeface="Times"/>
+              </a:rPr>
+              <a:t>inside the boxes sitting in front of you. </a:t>
+            </a:r>
+            <a:r>
+              <a:rPr lang="en-US" sz="3000" dirty="0" smtClean="0">
+                <a:latin typeface="Times"/>
+                <a:cs typeface="Times"/>
+              </a:rPr>
+              <a:t> Please be carefu</a:t>
+            </a:r>
+            <a:r>
+              <a:rPr lang="en-US" sz="3000" dirty="0" smtClean="0">
+                <a:latin typeface="Times"/>
+                <a:cs typeface="Times"/>
+              </a:rPr>
+              <a:t>l to NOT press down with any force on the plastic screws—simply rest your fingers on them so that you can feel them.</a:t>
+            </a:r>
+            <a:r>
+              <a:rPr lang="en-US" sz="3000" dirty="0">
+                <a:latin typeface="Times"/>
+                <a:cs typeface="Times"/>
+              </a:rPr>
+              <a:t> </a:t>
             </a:r>
             <a:endParaRPr lang="en-US" sz="3000" dirty="0" smtClean="0">
               <a:latin typeface="Times"/>
@@ -3197,40 +3239,40 @@
             </a:endParaRPr>
           </a:p>
           <a:p>
+            <a:endParaRPr lang="en-US" sz="1500" dirty="0">
+              <a:latin typeface="Times"/>
+              <a:cs typeface="Times"/>
+            </a:endParaRPr>
+          </a:p>
+          <a:p>
+            <a:r>
+              <a:rPr lang="en-US" sz="3000" dirty="0">
+                <a:latin typeface="Times"/>
+                <a:cs typeface="Times"/>
+              </a:rPr>
+              <a:t>At the beginning of each trial, you will be presented with either a left or right arrow in the middle of the computer </a:t>
+            </a:r>
+            <a:r>
+              <a:rPr lang="en-US" sz="3000" dirty="0" smtClean="0">
+                <a:latin typeface="Times"/>
+                <a:cs typeface="Times"/>
+              </a:rPr>
+              <a:t>screen: </a:t>
+            </a:r>
+          </a:p>
+          <a:p>
             <a:endParaRPr lang="en-US" sz="3000" dirty="0">
               <a:latin typeface="Times"/>
               <a:cs typeface="Times"/>
             </a:endParaRPr>
           </a:p>
           <a:p>
-            <a:r>
-              <a:rPr lang="en-US" sz="3000" dirty="0">
-                <a:latin typeface="Times"/>
-                <a:cs typeface="Times"/>
-              </a:rPr>
-              <a:t>At the beginning of each trial, you will be presented with either a left or right arrow in the middle of the computer </a:t>
-            </a:r>
-            <a:r>
-              <a:rPr lang="en-US" sz="3000" dirty="0" smtClean="0">
-                <a:latin typeface="Times"/>
-                <a:cs typeface="Times"/>
-              </a:rPr>
-              <a:t>screen: </a:t>
-            </a:r>
-          </a:p>
-          <a:p>
             <a:endParaRPr lang="en-US" sz="3000" dirty="0">
               <a:latin typeface="Times"/>
               <a:cs typeface="Times"/>
             </a:endParaRPr>
           </a:p>
           <a:p>
-            <a:endParaRPr lang="en-US" sz="3000" dirty="0">
-              <a:latin typeface="Times"/>
-              <a:cs typeface="Times"/>
-            </a:endParaRPr>
-          </a:p>
-          <a:p>
             <a:endParaRPr lang="en-US" sz="3000" dirty="0" smtClean="0">
               <a:latin typeface="Times"/>
               <a:cs typeface="Times"/>
@@ -3248,8 +3290,8 @@
         </p:nvSpPr>
         <p:spPr>
           <a:xfrm>
-            <a:off x="1964265" y="4588946"/>
-            <a:ext cx="1845739" cy="1134570"/>
+            <a:off x="2336798" y="5215468"/>
+            <a:ext cx="1487563" cy="914400"/>
           </a:xfrm>
           <a:prstGeom prst="leftArrow">
             <a:avLst>
@@ -3292,7 +3334,7 @@
         </p:nvSpPr>
         <p:spPr>
           <a:xfrm>
-            <a:off x="4301057" y="4809196"/>
+            <a:off x="4233325" y="5401851"/>
             <a:ext cx="728133" cy="553998"/>
           </a:xfrm>
           <a:prstGeom prst="rect">
@@ -3344,12 +3386,18 @@
           <a:p>
             <a:r>
               <a:rPr lang="en-US" sz="3000" dirty="0" smtClean="0">
+                <a:solidFill>
+                  <a:srgbClr val="FFFF00"/>
+                </a:solidFill>
                 <a:latin typeface="Times"/>
                 <a:cs typeface="Times"/>
               </a:rPr>
               <a:t>Press the left foot pedal to continue…</a:t>
             </a:r>
             <a:endParaRPr lang="en-US" sz="3000" dirty="0">
+              <a:solidFill>
+                <a:srgbClr val="FFFF00"/>
+              </a:solidFill>
               <a:latin typeface="Times"/>
               <a:cs typeface="Times"/>
             </a:endParaRPr>
@@ -3366,8 +3414,8 @@
         </p:nvSpPr>
         <p:spPr>
           <a:xfrm flipH="1">
-            <a:off x="5588000" y="4588946"/>
-            <a:ext cx="1845739" cy="1134570"/>
+            <a:off x="5409908" y="5215467"/>
+            <a:ext cx="1487562" cy="914400"/>
           </a:xfrm>
           <a:prstGeom prst="leftArrow">
             <a:avLst>
@@ -3441,7 +3489,7 @@
         <p:spPr>
           <a:xfrm>
             <a:off x="218553" y="178138"/>
-            <a:ext cx="8720667" cy="5632311"/>
+            <a:ext cx="8720667" cy="6555641"/>
           </a:xfrm>
           <a:prstGeom prst="rect">
             <a:avLst/>
@@ -3491,10 +3539,29 @@
               </a:rPr>
               <a:t> </a:t>
             </a:r>
+            <a:endParaRPr lang="en-US" sz="3000" dirty="0" smtClean="0">
+              <a:latin typeface="Times"/>
+              <a:cs typeface="Times"/>
+            </a:endParaRPr>
+          </a:p>
+          <a:p>
+            <a:endParaRPr lang="en-US" sz="3000" dirty="0">
+              <a:latin typeface="Times"/>
+              <a:cs typeface="Times"/>
+            </a:endParaRPr>
+          </a:p>
+          <a:p>
+            <a:endParaRPr lang="en-US" sz="3000" dirty="0">
+              <a:latin typeface="Times"/>
+              <a:cs typeface="Times"/>
+            </a:endParaRPr>
           </a:p>
           <a:p>
             <a:r>
               <a:rPr lang="en-US" sz="3000" dirty="0">
+                <a:solidFill>
+                  <a:srgbClr val="FFFF00"/>
+                </a:solidFill>
                 <a:latin typeface="Times"/>
                 <a:cs typeface="Times"/>
               </a:rPr>
@@ -3542,7 +3609,7 @@
         <p:spPr>
           <a:xfrm>
             <a:off x="218553" y="178138"/>
-            <a:ext cx="8720667" cy="4247317"/>
+            <a:ext cx="8720667" cy="6555641"/>
           </a:xfrm>
           <a:prstGeom prst="rect">
             <a:avLst/>
@@ -3591,7 +3658,14 @@
                 <a:latin typeface="Times"/>
                 <a:cs typeface="Times"/>
               </a:rPr>
-              <a:t>quickly compared to Practice Session 1. </a:t>
+              <a:t>quickly compared to Practice Session </a:t>
+            </a:r>
+            <a:r>
+              <a:rPr lang="en-US" sz="3000" dirty="0" smtClean="0">
+                <a:latin typeface="Times"/>
+                <a:cs typeface="Times"/>
+              </a:rPr>
+              <a:t>1, and the touches to your index fingers will be more subtle. </a:t>
             </a:r>
             <a:endParaRPr lang="en-US" sz="3000" dirty="0" smtClean="0">
               <a:latin typeface="Times"/>
@@ -3599,14 +3673,41 @@
             </a:endParaRPr>
           </a:p>
           <a:p>
+            <a:endParaRPr lang="en-US" sz="3000" dirty="0" smtClean="0">
+              <a:latin typeface="Times"/>
+              <a:cs typeface="Times"/>
+            </a:endParaRPr>
+          </a:p>
+          <a:p>
             <a:endParaRPr lang="en-US" sz="3000" dirty="0">
               <a:latin typeface="Times"/>
               <a:cs typeface="Times"/>
             </a:endParaRPr>
           </a:p>
           <a:p>
+            <a:endParaRPr lang="en-US" sz="3000" dirty="0" smtClean="0">
+              <a:latin typeface="Times"/>
+              <a:cs typeface="Times"/>
+            </a:endParaRPr>
+          </a:p>
+          <a:p>
+            <a:endParaRPr lang="en-US" sz="3000" dirty="0">
+              <a:latin typeface="Times"/>
+              <a:cs typeface="Times"/>
+            </a:endParaRPr>
+          </a:p>
+          <a:p>
+            <a:endParaRPr lang="en-US" sz="3000" dirty="0">
+              <a:latin typeface="Times"/>
+              <a:cs typeface="Times"/>
+            </a:endParaRPr>
+          </a:p>
+          <a:p>
             <a:r>
               <a:rPr lang="en-US" sz="3000" dirty="0" smtClean="0">
+                <a:solidFill>
+                  <a:srgbClr val="FFFF00"/>
+                </a:solidFill>
                 <a:latin typeface="Times"/>
                 <a:cs typeface="Times"/>
               </a:rPr>
@@ -3614,6 +3715,9 @@
             </a:r>
             <a:r>
               <a:rPr lang="en-US" sz="3000" dirty="0">
+                <a:solidFill>
+                  <a:srgbClr val="FFFF00"/>
+                </a:solidFill>
                 <a:latin typeface="Times"/>
                 <a:cs typeface="Times"/>
               </a:rPr>
@@ -3755,12 +3859,18 @@
           <a:p>
             <a:r>
               <a:rPr lang="en-US" sz="3000" dirty="0" smtClean="0">
+                <a:solidFill>
+                  <a:srgbClr val="FFFF00"/>
+                </a:solidFill>
                 <a:latin typeface="Times"/>
                 <a:cs typeface="Times"/>
               </a:rPr>
               <a:t>Press the left foot pedal to continue…</a:t>
             </a:r>
             <a:endParaRPr lang="en-US" sz="3000" dirty="0">
+              <a:solidFill>
+                <a:srgbClr val="FFFF00"/>
+              </a:solidFill>
               <a:latin typeface="Times"/>
               <a:cs typeface="Times"/>
             </a:endParaRPr>
@@ -3806,7 +3916,7 @@
         <p:spPr>
           <a:xfrm>
             <a:off x="218553" y="178138"/>
-            <a:ext cx="8720667" cy="6093976"/>
+            <a:ext cx="8720667" cy="6555641"/>
           </a:xfrm>
           <a:prstGeom prst="rect">
             <a:avLst/>
@@ -3830,7 +3940,14 @@
                 <a:latin typeface="Times"/>
                 <a:cs typeface="Times"/>
               </a:rPr>
-              <a:t>you are ready, we will begin the task. There will be a total of 286 trials with several breaks along the way. Again, you may quit the experiment at any point by pressing the middle foot pedal during a green cross screen. </a:t>
+              <a:t>you are ready, we will begin the task. </a:t>
+            </a:r>
+            <a:r>
+              <a:rPr lang="en-US" sz="3000" dirty="0" smtClean="0">
+                <a:latin typeface="Times"/>
+                <a:cs typeface="Times"/>
+              </a:rPr>
+              <a:t>The task should last roughly 21-24 minutes, with 3 breaks along the way. </a:t>
             </a:r>
           </a:p>
           <a:p>
@@ -3850,6 +3967,17 @@
               </a:rPr>
               <a:t>Please remember to do your best to blink only during the green cross and not during the arrows. Please also remember to sit as still as possible without moving your arms and legs while the task is in progress. </a:t>
             </a:r>
+            <a:r>
+              <a:rPr lang="en-US" sz="3000" dirty="0" smtClean="0">
+                <a:latin typeface="Times"/>
+                <a:cs typeface="Times"/>
+              </a:rPr>
+              <a:t>Before you begin, make sure you are in a comfortable position, and give yourself a few moments to become still. </a:t>
+            </a:r>
+            <a:endParaRPr lang="en-US" sz="3000" dirty="0">
+              <a:latin typeface="Times"/>
+              <a:cs typeface="Times"/>
+            </a:endParaRPr>
           </a:p>
           <a:p>
             <a:r>
@@ -3865,14 +3993,26 @@
             </a:endParaRPr>
           </a:p>
           <a:p>
+            <a:endParaRPr lang="en-US" sz="3000" dirty="0" smtClean="0">
+              <a:latin typeface="Times"/>
+              <a:cs typeface="Times"/>
+            </a:endParaRPr>
+          </a:p>
+          <a:p>
             <a:r>
               <a:rPr lang="en-US" sz="3000" dirty="0" smtClean="0">
+                <a:solidFill>
+                  <a:srgbClr val="FFFF00"/>
+                </a:solidFill>
                 <a:latin typeface="Times"/>
                 <a:cs typeface="Times"/>
               </a:rPr>
               <a:t>Press the left foot pedal when you are ready to begin the task…</a:t>
             </a:r>
             <a:endParaRPr lang="en-US" sz="3000" dirty="0">
+              <a:solidFill>
+                <a:srgbClr val="FFFF00"/>
+              </a:solidFill>
               <a:latin typeface="Times"/>
               <a:cs typeface="Times"/>
             </a:endParaRPr>
@@ -3940,6 +4080,58 @@
           </a:p>
           <a:p>
             <a:endParaRPr lang="en-US" sz="3000" dirty="0">
+              <a:latin typeface="Times"/>
+              <a:cs typeface="Times"/>
+            </a:endParaRPr>
+          </a:p>
+        </p:txBody>
+      </p:sp>
+      <p:sp>
+        <p:nvSpPr>
+          <p:cNvPr id="2" name="Rectangle 1"/>
+          <p:cNvSpPr/>
+          <p:nvPr/>
+        </p:nvSpPr>
+        <p:spPr>
+          <a:xfrm>
+            <a:off x="218553" y="5980670"/>
+            <a:ext cx="6653220" cy="553998"/>
+          </a:xfrm>
+          <a:prstGeom prst="rect">
+            <a:avLst/>
+          </a:prstGeom>
+        </p:spPr>
+        <p:txBody>
+          <a:bodyPr wrap="square">
+            <a:spAutoFit/>
+          </a:bodyPr>
+          <a:lstStyle/>
+          <a:p>
+            <a:pPr lvl="0"/>
+            <a:r>
+              <a:rPr lang="en-US" sz="3000" dirty="0">
+                <a:solidFill>
+                  <a:srgbClr val="FFFF00"/>
+                </a:solidFill>
+                <a:latin typeface="Times"/>
+                <a:cs typeface="Times"/>
+              </a:rPr>
+              <a:t>Press the left foot pedal </a:t>
+            </a:r>
+            <a:r>
+              <a:rPr lang="en-US" sz="3000" dirty="0" smtClean="0">
+                <a:solidFill>
+                  <a:srgbClr val="FFFF00"/>
+                </a:solidFill>
+                <a:latin typeface="Times"/>
+                <a:cs typeface="Times"/>
+              </a:rPr>
+              <a:t>to end this task…</a:t>
+            </a:r>
+            <a:endParaRPr lang="en-US" sz="3000" dirty="0">
+              <a:solidFill>
+                <a:srgbClr val="FFFF00"/>
+              </a:solidFill>
               <a:latin typeface="Times"/>
               <a:cs typeface="Times"/>
             </a:endParaRPr>
@@ -4449,7 +4641,21 @@
                 <a:latin typeface="Times"/>
                 <a:cs typeface="Times"/>
               </a:rPr>
-              <a:t>arrow, please pay attention to only your left index finger</a:t>
+              <a:t>arrow, please </a:t>
+            </a:r>
+            <a:r>
+              <a:rPr lang="en-US" sz="3000" u="sng" dirty="0" smtClean="0">
+                <a:latin typeface="Times"/>
+                <a:cs typeface="Times"/>
+              </a:rPr>
+              <a:t>direct your </a:t>
+            </a:r>
+            <a:r>
+              <a:rPr lang="en-US" sz="3000" u="sng" dirty="0">
+                <a:latin typeface="Times"/>
+                <a:cs typeface="Times"/>
+              </a:rPr>
+              <a:t>attention to only your left index finger</a:t>
             </a:r>
             <a:r>
               <a:rPr lang="en-US" sz="3000" u="sng" dirty="0" smtClean="0">
@@ -4546,12 +4752,18 @@
           <a:p>
             <a:r>
               <a:rPr lang="en-US" sz="3000" dirty="0" smtClean="0">
+                <a:solidFill>
+                  <a:srgbClr val="FFFF00"/>
+                </a:solidFill>
                 <a:latin typeface="Times"/>
                 <a:cs typeface="Times"/>
               </a:rPr>
               <a:t>Press the left foot pedal to continue…</a:t>
             </a:r>
             <a:endParaRPr lang="en-US" sz="3000" dirty="0">
+              <a:solidFill>
+                <a:srgbClr val="FFFF00"/>
+              </a:solidFill>
               <a:latin typeface="Times"/>
               <a:cs typeface="Times"/>
             </a:endParaRPr>
@@ -4815,7 +5027,7 @@
         <p:spPr>
           <a:xfrm>
             <a:off x="218553" y="178138"/>
-            <a:ext cx="8720667" cy="5632311"/>
+            <a:ext cx="8720667" cy="6555641"/>
           </a:xfrm>
           <a:prstGeom prst="rect">
             <a:avLst/>
@@ -4847,7 +5059,35 @@
                 <a:latin typeface="Times"/>
                 <a:cs typeface="Times"/>
               </a:rPr>
-              <a:t>Please still try to remain still without moving very much, as it can disrupt the sensors on the EEG cap, but feel free to make small adjustments in your posture to be more comfortable.  </a:t>
+              <a:t>Please </a:t>
+            </a:r>
+            <a:r>
+              <a:rPr lang="en-US" sz="3000" dirty="0" smtClean="0">
+                <a:latin typeface="Times"/>
+                <a:cs typeface="Times"/>
+              </a:rPr>
+              <a:t>try </a:t>
+            </a:r>
+            <a:r>
+              <a:rPr lang="en-US" sz="3000" dirty="0" smtClean="0">
+                <a:latin typeface="Times"/>
+                <a:cs typeface="Times"/>
+              </a:rPr>
+              <a:t>to remain </a:t>
+            </a:r>
+            <a:r>
+              <a:rPr lang="en-US" sz="3000" dirty="0" smtClean="0">
+                <a:latin typeface="Times"/>
+                <a:cs typeface="Times"/>
+              </a:rPr>
+              <a:t>as still as possible, </a:t>
+            </a:r>
+            <a:r>
+              <a:rPr lang="en-US" sz="3000" dirty="0" smtClean="0">
+                <a:latin typeface="Times"/>
+                <a:cs typeface="Times"/>
+              </a:rPr>
+              <a:t>as it can disrupt the sensors on the EEG cap, but feel free to make small adjustments in your posture to be more comfortable.  </a:t>
             </a:r>
           </a:p>
           <a:p>
@@ -4866,20 +5106,44 @@
             </a:r>
           </a:p>
           <a:p>
+            <a:endParaRPr lang="en-US" sz="3000" dirty="0" smtClean="0">
+              <a:latin typeface="Times"/>
+              <a:cs typeface="Times"/>
+            </a:endParaRPr>
+          </a:p>
+          <a:p>
             <a:endParaRPr lang="en-US" sz="3000" dirty="0">
               <a:latin typeface="Times"/>
               <a:cs typeface="Times"/>
             </a:endParaRPr>
           </a:p>
           <a:p>
+            <a:endParaRPr lang="en-US" sz="3000" dirty="0" smtClean="0">
+              <a:latin typeface="Times"/>
+              <a:cs typeface="Times"/>
+            </a:endParaRPr>
+          </a:p>
+          <a:p>
+            <a:endParaRPr lang="en-US" sz="3000" dirty="0">
+              <a:latin typeface="Times"/>
+              <a:cs typeface="Times"/>
+            </a:endParaRPr>
+          </a:p>
+          <a:p>
             <a:r>
               <a:rPr lang="en-US" sz="3000" dirty="0" smtClean="0">
+                <a:solidFill>
+                  <a:srgbClr val="FFFF00"/>
+                </a:solidFill>
                 <a:latin typeface="Times"/>
                 <a:cs typeface="Times"/>
               </a:rPr>
               <a:t>If you would like to continue with the task before the break is over, press the left foot pedal…</a:t>
             </a:r>
             <a:endParaRPr lang="en-US" sz="3000" dirty="0">
+              <a:solidFill>
+                <a:srgbClr val="FFFF00"/>
+              </a:solidFill>
               <a:latin typeface="Times"/>
               <a:cs typeface="Times"/>
             </a:endParaRPr>
@@ -4924,8 +5188,8 @@
         </p:nvSpPr>
         <p:spPr>
           <a:xfrm>
-            <a:off x="218553" y="2921337"/>
-            <a:ext cx="8720667" cy="1477328"/>
+            <a:off x="150821" y="2921337"/>
+            <a:ext cx="8925447" cy="1477328"/>
           </a:xfrm>
           <a:prstGeom prst="rect">
             <a:avLst/>
@@ -4942,7 +5206,21 @@
                 <a:latin typeface="Times"/>
                 <a:cs typeface="Times"/>
               </a:rPr>
-              <a:t>You have 10 seconds remaining in the break. The task will resume automatically… </a:t>
+              <a:t>You have 10 seconds remaining in the break</a:t>
+            </a:r>
+            <a:r>
+              <a:rPr lang="en-US" sz="3000" dirty="0" smtClean="0">
+                <a:latin typeface="Times"/>
+                <a:cs typeface="Times"/>
+              </a:rPr>
+              <a:t>. Please be as still as possible. </a:t>
+            </a:r>
+            <a:r>
+              <a:rPr lang="en-US" sz="3000" dirty="0" smtClean="0">
+                <a:latin typeface="Times"/>
+                <a:cs typeface="Times"/>
+              </a:rPr>
+              <a:t>The task will resume automatically… </a:t>
             </a:r>
           </a:p>
           <a:p>
@@ -5051,7 +5329,28 @@
                 <a:latin typeface="Times"/>
                 <a:cs typeface="Times"/>
               </a:rPr>
-              <a:t>arrow, please pay attention to only your </a:t>
+              <a:t>arrow, please </a:t>
+            </a:r>
+            <a:r>
+              <a:rPr lang="en-US" sz="3000" u="sng" dirty="0" smtClean="0">
+                <a:latin typeface="Times"/>
+                <a:cs typeface="Times"/>
+              </a:rPr>
+              <a:t>direct your</a:t>
+            </a:r>
+            <a:r>
+              <a:rPr lang="en-US" sz="3000" u="sng" dirty="0" smtClean="0">
+                <a:latin typeface="Times"/>
+                <a:cs typeface="Times"/>
+              </a:rPr>
+              <a:t> </a:t>
+            </a:r>
+            <a:r>
+              <a:rPr lang="en-US" sz="3000" u="sng" dirty="0">
+                <a:latin typeface="Times"/>
+                <a:cs typeface="Times"/>
+              </a:rPr>
+              <a:t>attention to only your </a:t>
             </a:r>
             <a:r>
               <a:rPr lang="en-US" sz="3000" u="sng" dirty="0" smtClean="0">
@@ -5162,12 +5461,18 @@
           <a:p>
             <a:r>
               <a:rPr lang="en-US" sz="3000" dirty="0" smtClean="0">
+                <a:solidFill>
+                  <a:srgbClr val="FFFF00"/>
+                </a:solidFill>
                 <a:latin typeface="Times"/>
                 <a:cs typeface="Times"/>
               </a:rPr>
               <a:t>Press the left foot pedal to continue…</a:t>
             </a:r>
             <a:endParaRPr lang="en-US" sz="3000" dirty="0">
+              <a:solidFill>
+                <a:srgbClr val="FFFF00"/>
+              </a:solidFill>
               <a:latin typeface="Times"/>
               <a:cs typeface="Times"/>
             </a:endParaRPr>
@@ -5259,7 +5564,7 @@
         <p:spPr>
           <a:xfrm>
             <a:off x="186266" y="178138"/>
-            <a:ext cx="8720667" cy="6586418"/>
+            <a:ext cx="8720667" cy="6740307"/>
           </a:xfrm>
           <a:prstGeom prst="rect">
             <a:avLst/>
@@ -5306,6 +5611,12 @@
             </a:endParaRPr>
           </a:p>
           <a:p>
+            <a:endParaRPr lang="en-US" sz="1000" dirty="0" smtClean="0">
+              <a:latin typeface="Times"/>
+              <a:cs typeface="Times"/>
+            </a:endParaRPr>
+          </a:p>
+          <a:p>
             <a:r>
               <a:rPr lang="en-US" sz="3000" dirty="0" smtClean="0">
                 <a:latin typeface="Times"/>
@@ -5347,7 +5658,42 @@
                 <a:latin typeface="Times"/>
                 <a:cs typeface="Times"/>
               </a:rPr>
-              <a:t>” (if you felt a touch) and the right foot pedal for “no” (if you did NOT feel a touch). You will have 1 second to respond. Responses are only recorded during the green cross. </a:t>
+              <a:t>” (if you felt a touch) and the right foot pedal for “no” (if you did NOT feel a touch). You will have </a:t>
+            </a:r>
+            <a:r>
+              <a:rPr lang="en-US" sz="3000" dirty="0" smtClean="0">
+                <a:latin typeface="Times"/>
+                <a:cs typeface="Times"/>
+              </a:rPr>
+              <a:t>up to 1.5 seconds </a:t>
+            </a:r>
+            <a:r>
+              <a:rPr lang="en-US" sz="3000" dirty="0">
+                <a:latin typeface="Times"/>
+                <a:cs typeface="Times"/>
+              </a:rPr>
+              <a:t>to respond. </a:t>
+            </a:r>
+            <a:r>
+              <a:rPr lang="en-US" sz="3000" u="sng" dirty="0">
+                <a:latin typeface="Times"/>
+                <a:cs typeface="Times"/>
+              </a:rPr>
+              <a:t>Responses are </a:t>
+            </a:r>
+            <a:r>
+              <a:rPr lang="en-US" sz="3000" u="sng" dirty="0" smtClean="0">
+                <a:latin typeface="Times"/>
+                <a:cs typeface="Times"/>
+              </a:rPr>
+              <a:t>ONLY </a:t>
+            </a:r>
+            <a:r>
+              <a:rPr lang="en-US" sz="3000" u="sng" dirty="0">
+                <a:latin typeface="Times"/>
+                <a:cs typeface="Times"/>
+              </a:rPr>
+              <a:t>recorded during the green cross. </a:t>
             </a:r>
           </a:p>
           <a:p>
@@ -5374,7 +5720,7 @@
         </p:nvSpPr>
         <p:spPr>
           <a:xfrm>
-            <a:off x="3522139" y="541874"/>
+            <a:off x="3522139" y="592673"/>
             <a:ext cx="1965065" cy="1810510"/>
           </a:xfrm>
           <a:prstGeom prst="mathPlus">
@@ -5447,12 +5793,18 @@
           <a:p>
             <a:r>
               <a:rPr lang="en-US" sz="3000" dirty="0" smtClean="0">
+                <a:solidFill>
+                  <a:srgbClr val="FFFF00"/>
+                </a:solidFill>
                 <a:latin typeface="Times"/>
                 <a:cs typeface="Times"/>
               </a:rPr>
               <a:t>Press the left foot pedal to continue…</a:t>
             </a:r>
             <a:endParaRPr lang="en-US" sz="3000" dirty="0">
+              <a:solidFill>
+                <a:srgbClr val="FFFF00"/>
+              </a:solidFill>
               <a:latin typeface="Times"/>
               <a:cs typeface="Times"/>
             </a:endParaRPr>
@@ -5639,12 +5991,18 @@
           <a:p>
             <a:r>
               <a:rPr lang="en-US" sz="3000" dirty="0" smtClean="0">
+                <a:solidFill>
+                  <a:srgbClr val="FFFF00"/>
+                </a:solidFill>
                 <a:latin typeface="Times"/>
                 <a:cs typeface="Times"/>
               </a:rPr>
               <a:t>Press the left foot pedal to continue…</a:t>
             </a:r>
             <a:endParaRPr lang="en-US" sz="3000" dirty="0">
+              <a:solidFill>
+                <a:srgbClr val="FFFF00"/>
+              </a:solidFill>
               <a:latin typeface="Times"/>
               <a:cs typeface="Times"/>
             </a:endParaRPr>
@@ -5661,7 +6019,7 @@
         </p:nvSpPr>
         <p:spPr>
           <a:xfrm>
-            <a:off x="3522139" y="541874"/>
+            <a:off x="3522139" y="592673"/>
             <a:ext cx="1965065" cy="1810510"/>
           </a:xfrm>
           <a:prstGeom prst="mathPlus">
@@ -5749,7 +6107,7 @@
         <p:spPr>
           <a:xfrm>
             <a:off x="186266" y="178138"/>
-            <a:ext cx="8720667" cy="6093976"/>
+            <a:ext cx="8720667" cy="6555641"/>
           </a:xfrm>
           <a:prstGeom prst="rect">
             <a:avLst/>
@@ -5762,32 +6120,11 @@
           <a:lstStyle/>
           <a:p>
             <a:r>
-              <a:rPr lang="en-US" sz="3000" dirty="0">
-                <a:latin typeface="Times"/>
-                <a:cs typeface="Times"/>
-              </a:rPr>
-              <a:t>We ask that you please do your best to </a:t>
-            </a:r>
-            <a:r>
-              <a:rPr lang="en-US" sz="3000" u="sng" dirty="0">
-                <a:latin typeface="Times"/>
-                <a:cs typeface="Times"/>
-              </a:rPr>
-              <a:t>not blink </a:t>
-            </a:r>
-            <a:r>
-              <a:rPr lang="en-US" sz="3000" dirty="0">
-                <a:latin typeface="Times"/>
-                <a:cs typeface="Times"/>
-              </a:rPr>
-              <a:t>until the green cross is presented. That is, try not to blink while an arrow appears on the screen. </a:t>
-            </a:r>
-            <a:r>
               <a:rPr lang="en-US" sz="3000" dirty="0" smtClean="0">
                 <a:latin typeface="Times"/>
                 <a:cs typeface="Times"/>
               </a:rPr>
-              <a:t>Please also do your best to remain as still as possible throughout the task, without moving your arms and legs. </a:t>
+              <a:t>Again, remember that you cannot respond until the green cross appears on the screen.</a:t>
             </a:r>
           </a:p>
           <a:p>
@@ -5798,11 +6135,68 @@
           </a:p>
           <a:p>
             <a:r>
+              <a:rPr lang="en-US" sz="3000" dirty="0" smtClean="0">
+                <a:latin typeface="Times"/>
+                <a:cs typeface="Times"/>
+              </a:rPr>
+              <a:t>We </a:t>
+            </a:r>
+            <a:r>
               <a:rPr lang="en-US" sz="3000" dirty="0">
                 <a:latin typeface="Times"/>
                 <a:cs typeface="Times"/>
               </a:rPr>
-              <a:t>Please let the experimenter know if you have any questions or if you experience any discomfort at any point during the experiment. You may quit the experiment any time by pressing the middle foot pedal during a green cross. </a:t>
+              <a:t>ask that </a:t>
+            </a:r>
+            <a:r>
+              <a:rPr lang="en-US" sz="3000" dirty="0" smtClean="0">
+                <a:latin typeface="Times"/>
+                <a:cs typeface="Times"/>
+              </a:rPr>
+              <a:t>you </a:t>
+            </a:r>
+            <a:r>
+              <a:rPr lang="en-US" sz="3000" dirty="0">
+                <a:latin typeface="Times"/>
+                <a:cs typeface="Times"/>
+              </a:rPr>
+              <a:t>do your best to </a:t>
+            </a:r>
+            <a:r>
+              <a:rPr lang="en-US" sz="3000" u="sng" dirty="0">
+                <a:latin typeface="Times"/>
+                <a:cs typeface="Times"/>
+              </a:rPr>
+              <a:t>not blink </a:t>
+            </a:r>
+            <a:r>
+              <a:rPr lang="en-US" sz="3000" dirty="0">
+                <a:latin typeface="Times"/>
+                <a:cs typeface="Times"/>
+              </a:rPr>
+              <a:t>until the green cross is presented. That is, try not to blink while an arrow appears on the screen. </a:t>
+            </a:r>
+            <a:r>
+              <a:rPr lang="en-US" sz="3000" dirty="0" smtClean="0">
+                <a:latin typeface="Times"/>
+                <a:cs typeface="Times"/>
+              </a:rPr>
+              <a:t>Please also do your best to remain as still as possible throughout the task, without moving your arms and legs. </a:t>
+            </a:r>
+          </a:p>
+          <a:p>
+            <a:endParaRPr lang="en-US" sz="3000" dirty="0">
+              <a:latin typeface="Times"/>
+              <a:cs typeface="Times"/>
+            </a:endParaRPr>
+          </a:p>
+          <a:p>
+            <a:r>
+              <a:rPr lang="en-US" sz="3000" dirty="0">
+                <a:latin typeface="Times"/>
+                <a:cs typeface="Times"/>
+              </a:rPr>
+              <a:t>Please let the experimenter know if you have any questions or if you experience any discomfort at any point during the experiment. </a:t>
             </a:r>
           </a:p>
           <a:p>
@@ -5846,12 +6240,18 @@
           <a:p>
             <a:r>
               <a:rPr lang="en-US" sz="3000" dirty="0" smtClean="0">
+                <a:solidFill>
+                  <a:srgbClr val="FFFF00"/>
+                </a:solidFill>
                 <a:latin typeface="Times"/>
                 <a:cs typeface="Times"/>
               </a:rPr>
               <a:t>Press the left foot pedal to continue…</a:t>
             </a:r>
             <a:endParaRPr lang="en-US" sz="3000" dirty="0">
+              <a:solidFill>
+                <a:srgbClr val="FFFF00"/>
+              </a:solidFill>
               <a:latin typeface="Times"/>
               <a:cs typeface="Times"/>
             </a:endParaRPr>
@@ -5897,7 +6297,7 @@
         <p:spPr>
           <a:xfrm>
             <a:off x="186266" y="2328671"/>
-            <a:ext cx="8720667" cy="2400657"/>
+            <a:ext cx="8720667" cy="4247317"/>
           </a:xfrm>
           <a:prstGeom prst="rect">
             <a:avLst/>
@@ -5928,14 +6328,41 @@
             </a:endParaRPr>
           </a:p>
           <a:p>
+            <a:endParaRPr lang="en-US" sz="3000" dirty="0" smtClean="0">
+              <a:latin typeface="Times"/>
+              <a:cs typeface="Times"/>
+            </a:endParaRPr>
+          </a:p>
+          <a:p>
             <a:endParaRPr lang="en-US" sz="3000" dirty="0">
               <a:latin typeface="Times"/>
               <a:cs typeface="Times"/>
             </a:endParaRPr>
           </a:p>
           <a:p>
+            <a:endParaRPr lang="en-US" sz="3000" dirty="0" smtClean="0">
+              <a:latin typeface="Times"/>
+              <a:cs typeface="Times"/>
+            </a:endParaRPr>
+          </a:p>
+          <a:p>
+            <a:endParaRPr lang="en-US" sz="3000" dirty="0">
+              <a:latin typeface="Times"/>
+              <a:cs typeface="Times"/>
+            </a:endParaRPr>
+          </a:p>
+          <a:p>
+            <a:endParaRPr lang="en-US" sz="3000" dirty="0">
+              <a:latin typeface="Times"/>
+              <a:cs typeface="Times"/>
+            </a:endParaRPr>
+          </a:p>
+          <a:p>
             <a:r>
               <a:rPr lang="en-US" sz="3000" dirty="0" smtClean="0">
+                <a:solidFill>
+                  <a:srgbClr val="FFFF00"/>
+                </a:solidFill>
                 <a:latin typeface="Times"/>
                 <a:cs typeface="Times"/>
               </a:rPr>
@@ -5943,6 +6370,9 @@
             </a:r>
             <a:r>
               <a:rPr lang="en-US" sz="3000" dirty="0">
+                <a:solidFill>
+                  <a:srgbClr val="FFFF00"/>
+                </a:solidFill>
                 <a:latin typeface="Times"/>
                 <a:cs typeface="Times"/>
               </a:rPr>
@@ -6076,12 +6506,18 @@
           <a:p>
             <a:r>
               <a:rPr lang="en-US" sz="3000" dirty="0" smtClean="0">
+                <a:solidFill>
+                  <a:srgbClr val="FFFF00"/>
+                </a:solidFill>
                 <a:latin typeface="Times"/>
                 <a:cs typeface="Times"/>
               </a:rPr>
               <a:t>Press the left foot pedal to continue…</a:t>
             </a:r>
             <a:endParaRPr lang="en-US" sz="3000" dirty="0">
+              <a:solidFill>
+                <a:srgbClr val="FFFF00"/>
+              </a:solidFill>
               <a:latin typeface="Times"/>
               <a:cs typeface="Times"/>
             </a:endParaRPr>
@@ -6226,6 +6662,9 @@
           <a:p>
             <a:r>
               <a:rPr lang="en-US" sz="3000" dirty="0">
+                <a:solidFill>
+                  <a:srgbClr val="FFFF00"/>
+                </a:solidFill>
                 <a:latin typeface="Times"/>
                 <a:cs typeface="Times"/>
               </a:rPr>

</xml_diff>

<commit_message>
Fixed instructions and number of trials
Fixed instructions to say middle finger and changed # threshold trials
per hand to 105
</commit_message>
<xml_diff>
--- a/Stimuli/new/General instructions.pptx
+++ b/Stimuli/new/General instructions.pptx
@@ -310,7 +310,7 @@
           <a:p>
             <a:fld id="{6BFECD78-3C8E-49F2-8FAB-59489D168ABB}" type="datetimeFigureOut">
               <a:rPr lang="en-US" smtClean="0"/>
-              <a:t>8/9/16</a:t>
+              <a:t>8/17/16</a:t>
             </a:fld>
             <a:endParaRPr lang="en-US"/>
           </a:p>
@@ -480,7 +480,7 @@
           <a:p>
             <a:fld id="{6BFECD78-3C8E-49F2-8FAB-59489D168ABB}" type="datetimeFigureOut">
               <a:rPr lang="en-US" smtClean="0"/>
-              <a:t>8/9/16</a:t>
+              <a:t>8/17/16</a:t>
             </a:fld>
             <a:endParaRPr lang="en-US"/>
           </a:p>
@@ -660,7 +660,7 @@
           <a:p>
             <a:fld id="{6BFECD78-3C8E-49F2-8FAB-59489D168ABB}" type="datetimeFigureOut">
               <a:rPr lang="en-US" smtClean="0"/>
-              <a:t>8/9/16</a:t>
+              <a:t>8/17/16</a:t>
             </a:fld>
             <a:endParaRPr lang="en-US"/>
           </a:p>
@@ -830,7 +830,7 @@
           <a:p>
             <a:fld id="{6BFECD78-3C8E-49F2-8FAB-59489D168ABB}" type="datetimeFigureOut">
               <a:rPr lang="en-US" smtClean="0"/>
-              <a:t>8/9/16</a:t>
+              <a:t>8/17/16</a:t>
             </a:fld>
             <a:endParaRPr lang="en-US"/>
           </a:p>
@@ -1076,7 +1076,7 @@
           <a:p>
             <a:fld id="{6BFECD78-3C8E-49F2-8FAB-59489D168ABB}" type="datetimeFigureOut">
               <a:rPr lang="en-US" smtClean="0"/>
-              <a:t>8/9/16</a:t>
+              <a:t>8/17/16</a:t>
             </a:fld>
             <a:endParaRPr lang="en-US"/>
           </a:p>
@@ -1364,7 +1364,7 @@
           <a:p>
             <a:fld id="{6BFECD78-3C8E-49F2-8FAB-59489D168ABB}" type="datetimeFigureOut">
               <a:rPr lang="en-US" smtClean="0"/>
-              <a:t>8/9/16</a:t>
+              <a:t>8/17/16</a:t>
             </a:fld>
             <a:endParaRPr lang="en-US"/>
           </a:p>
@@ -1786,7 +1786,7 @@
           <a:p>
             <a:fld id="{6BFECD78-3C8E-49F2-8FAB-59489D168ABB}" type="datetimeFigureOut">
               <a:rPr lang="en-US" smtClean="0"/>
-              <a:t>8/9/16</a:t>
+              <a:t>8/17/16</a:t>
             </a:fld>
             <a:endParaRPr lang="en-US"/>
           </a:p>
@@ -1904,7 +1904,7 @@
           <a:p>
             <a:fld id="{6BFECD78-3C8E-49F2-8FAB-59489D168ABB}" type="datetimeFigureOut">
               <a:rPr lang="en-US" smtClean="0"/>
-              <a:t>8/9/16</a:t>
+              <a:t>8/17/16</a:t>
             </a:fld>
             <a:endParaRPr lang="en-US"/>
           </a:p>
@@ -1999,7 +1999,7 @@
           <a:p>
             <a:fld id="{6BFECD78-3C8E-49F2-8FAB-59489D168ABB}" type="datetimeFigureOut">
               <a:rPr lang="en-US" smtClean="0"/>
-              <a:t>8/9/16</a:t>
+              <a:t>8/17/16</a:t>
             </a:fld>
             <a:endParaRPr lang="en-US"/>
           </a:p>
@@ -2276,7 +2276,7 @@
           <a:p>
             <a:fld id="{6BFECD78-3C8E-49F2-8FAB-59489D168ABB}" type="datetimeFigureOut">
               <a:rPr lang="en-US" smtClean="0"/>
-              <a:t>8/9/16</a:t>
+              <a:t>8/17/16</a:t>
             </a:fld>
             <a:endParaRPr lang="en-US"/>
           </a:p>
@@ -2533,7 +2533,7 @@
           <a:p>
             <a:fld id="{6BFECD78-3C8E-49F2-8FAB-59489D168ABB}" type="datetimeFigureOut">
               <a:rPr lang="en-US" smtClean="0"/>
-              <a:t>8/9/16</a:t>
+              <a:t>8/17/16</a:t>
             </a:fld>
             <a:endParaRPr lang="en-US"/>
           </a:p>
@@ -2746,7 +2746,7 @@
           <a:p>
             <a:fld id="{6BFECD78-3C8E-49F2-8FAB-59489D168ABB}" type="datetimeFigureOut">
               <a:rPr lang="en-US" smtClean="0"/>
-              <a:t>8/9/16</a:t>
+              <a:t>8/17/16</a:t>
             </a:fld>
             <a:endParaRPr lang="en-US"/>
           </a:p>
@@ -3147,35 +3147,42 @@
                 <a:latin typeface="Times"/>
                 <a:cs typeface="Times"/>
               </a:rPr>
-              <a:t>Your task is to report when you have felt a gentle touch on your index </a:t>
+              <a:t>Your task is to report when you have felt a gentle touch on your </a:t>
             </a:r>
             <a:r>
               <a:rPr lang="en-US" sz="3000" dirty="0" smtClean="0">
                 <a:latin typeface="Times"/>
                 <a:cs typeface="Times"/>
               </a:rPr>
-              <a:t>fingers. </a:t>
+              <a:t>middle fingers. </a:t>
             </a:r>
             <a:r>
               <a:rPr lang="en-US" sz="3000" dirty="0">
                 <a:latin typeface="Times"/>
                 <a:cs typeface="Times"/>
               </a:rPr>
-              <a:t>These tactile stimuli will be delivered to your left and right index fingers </a:t>
+              <a:t>These tactile stimuli will be delivered to your left and right </a:t>
             </a:r>
             <a:r>
               <a:rPr lang="en-US" sz="3000" dirty="0" smtClean="0">
                 <a:latin typeface="Times"/>
                 <a:cs typeface="Times"/>
               </a:rPr>
-              <a:t>using </a:t>
+              <a:t>middle </a:t>
+            </a:r>
+            <a:r>
+              <a:rPr lang="en-US" sz="3000" dirty="0">
+                <a:latin typeface="Times"/>
+                <a:cs typeface="Times"/>
+              </a:rPr>
+              <a:t>fingers </a:t>
             </a:r>
             <a:r>
               <a:rPr lang="en-US" sz="3000" dirty="0" smtClean="0">
                 <a:latin typeface="Times"/>
                 <a:cs typeface="Times"/>
               </a:rPr>
-              <a:t>blunt </a:t>
+              <a:t>using blunt </a:t>
             </a:r>
             <a:r>
               <a:rPr lang="en-US" sz="3000" dirty="0">
@@ -3217,14 +3224,14 @@
                 <a:latin typeface="Times"/>
                 <a:cs typeface="Times"/>
               </a:rPr>
-              <a:t> Please be carefu</a:t>
-            </a:r>
-            <a:r>
-              <a:rPr lang="en-US" sz="3000" dirty="0" smtClean="0">
-                <a:latin typeface="Times"/>
-                <a:cs typeface="Times"/>
-              </a:rPr>
-              <a:t>l to NOT press down with any force on the plastic screws—simply rest your fingers on them so that you can feel them.</a:t>
+              <a:t> </a:t>
+            </a:r>
+            <a:r>
+              <a:rPr lang="en-US" sz="3000" u="sng" dirty="0" smtClean="0">
+                <a:latin typeface="Times"/>
+                <a:cs typeface="Times"/>
+              </a:rPr>
+              <a:t>Please be careful to NOT press down with any force on the plastic screws—simply rest your fingers on them so that you can feel them.</a:t>
             </a:r>
             <a:r>
               <a:rPr lang="en-US" sz="3000" dirty="0">
@@ -3528,7 +3535,21 @@
                 <a:latin typeface="Times"/>
                 <a:cs typeface="Times"/>
               </a:rPr>
-              <a:t>you are ready, we will begin the threshold procedure for your right finger. This time, you will only see right arrows, so please pay attention to your right finger only. When you see a green cross, please indicate whether you felt a touch on your right finger using the foot pedals.</a:t>
+              <a:t>you are ready, we will begin the threshold procedure for your </a:t>
+            </a:r>
+            <a:r>
+              <a:rPr lang="en-US" sz="3000" dirty="0" smtClean="0">
+                <a:latin typeface="Times"/>
+                <a:cs typeface="Times"/>
+              </a:rPr>
+              <a:t>right middle </a:t>
+            </a:r>
+            <a:r>
+              <a:rPr lang="en-US" sz="3000" dirty="0">
+                <a:latin typeface="Times"/>
+                <a:cs typeface="Times"/>
+              </a:rPr>
+              <a:t>finger. This time, you will only see right arrows, so please pay attention to your right finger only. When you see a green cross, please indicate whether you felt a touch on your right finger using the foot pedals.</a:t>
             </a:r>
           </a:p>
           <a:p>
@@ -3665,7 +3686,28 @@
                 <a:latin typeface="Times"/>
                 <a:cs typeface="Times"/>
               </a:rPr>
-              <a:t>1, and the touches to your index fingers will be more subtle. </a:t>
+              <a:t>1, and the touches to </a:t>
+            </a:r>
+            <a:r>
+              <a:rPr lang="en-US" sz="3000" dirty="0" smtClean="0">
+                <a:latin typeface="Times"/>
+                <a:cs typeface="Times"/>
+              </a:rPr>
+              <a:t>your middle fingers </a:t>
+            </a:r>
+            <a:r>
+              <a:rPr lang="en-US" sz="3000" dirty="0" smtClean="0">
+                <a:latin typeface="Times"/>
+                <a:cs typeface="Times"/>
+              </a:rPr>
+              <a:t>will be </a:t>
+            </a:r>
+            <a:r>
+              <a:rPr lang="en-US" sz="3000" dirty="0" smtClean="0">
+                <a:latin typeface="Times"/>
+                <a:cs typeface="Times"/>
+              </a:rPr>
+              <a:t>even more gentle. </a:t>
             </a:r>
             <a:endParaRPr lang="en-US" sz="3000" dirty="0" smtClean="0">
               <a:latin typeface="Times"/>
@@ -3947,7 +3989,7 @@
                 <a:latin typeface="Times"/>
                 <a:cs typeface="Times"/>
               </a:rPr>
-              <a:t>The task should last roughly 21-24 minutes, with 3 breaks along the way. </a:t>
+              <a:t>The task should last at most 20 minutes, with 3 breaks along the way. </a:t>
             </a:r>
           </a:p>
           <a:p>
@@ -4620,7 +4662,21 @@
                 <a:latin typeface="Times"/>
                 <a:cs typeface="Times"/>
               </a:rPr>
-              <a:t>left arrow indicates that a tactile stimulus may or may not be delivered to your left index finger. </a:t>
+              <a:t>left arrow indicates that a tactile stimulus may or may not be delivered to your left </a:t>
+            </a:r>
+            <a:r>
+              <a:rPr lang="en-US" sz="3000" dirty="0" smtClean="0">
+                <a:latin typeface="Times"/>
+                <a:cs typeface="Times"/>
+              </a:rPr>
+              <a:t>middle </a:t>
+            </a:r>
+            <a:r>
+              <a:rPr lang="en-US" sz="3000" dirty="0">
+                <a:latin typeface="Times"/>
+                <a:cs typeface="Times"/>
+              </a:rPr>
+              <a:t>finger. </a:t>
             </a:r>
             <a:r>
               <a:rPr lang="en-US" sz="3000" u="sng" dirty="0">
@@ -4655,7 +4711,21 @@
                 <a:latin typeface="Times"/>
                 <a:cs typeface="Times"/>
               </a:rPr>
-              <a:t>attention to only your left index finger</a:t>
+              <a:t>attention to only your left </a:t>
+            </a:r>
+            <a:r>
+              <a:rPr lang="en-US" sz="3000" u="sng" dirty="0" smtClean="0">
+                <a:latin typeface="Times"/>
+                <a:cs typeface="Times"/>
+              </a:rPr>
+              <a:t>middle </a:t>
+            </a:r>
+            <a:r>
+              <a:rPr lang="en-US" sz="3000" u="sng" dirty="0">
+                <a:latin typeface="Times"/>
+                <a:cs typeface="Times"/>
+              </a:rPr>
+              <a:t>finger</a:t>
             </a:r>
             <a:r>
               <a:rPr lang="en-US" sz="3000" u="sng" dirty="0" smtClean="0">
@@ -4720,7 +4790,7 @@
         </p:blipFill>
         <p:spPr>
           <a:xfrm flipH="1">
-            <a:off x="4722644" y="1709777"/>
+            <a:off x="4079190" y="1608179"/>
             <a:ext cx="1745892" cy="1658599"/>
           </a:xfrm>
           <a:prstGeom prst="rect">
@@ -5059,35 +5129,7 @@
                 <a:latin typeface="Times"/>
                 <a:cs typeface="Times"/>
               </a:rPr>
-              <a:t>Please </a:t>
-            </a:r>
-            <a:r>
-              <a:rPr lang="en-US" sz="3000" dirty="0" smtClean="0">
-                <a:latin typeface="Times"/>
-                <a:cs typeface="Times"/>
-              </a:rPr>
-              <a:t>try </a:t>
-            </a:r>
-            <a:r>
-              <a:rPr lang="en-US" sz="3000" dirty="0" smtClean="0">
-                <a:latin typeface="Times"/>
-                <a:cs typeface="Times"/>
-              </a:rPr>
-              <a:t>to remain </a:t>
-            </a:r>
-            <a:r>
-              <a:rPr lang="en-US" sz="3000" dirty="0" smtClean="0">
-                <a:latin typeface="Times"/>
-                <a:cs typeface="Times"/>
-              </a:rPr>
-              <a:t>as still as possible, </a:t>
-            </a:r>
-            <a:r>
-              <a:rPr lang="en-US" sz="3000" dirty="0" smtClean="0">
-                <a:latin typeface="Times"/>
-                <a:cs typeface="Times"/>
-              </a:rPr>
-              <a:t>as it can disrupt the sensors on the EEG cap, but feel free to make small adjustments in your posture to be more comfortable.  </a:t>
+              <a:t>Please try to remain as still as possible, as it can disrupt the sensors on the EEG cap, but feel free to make small adjustments in your posture to be more comfortable.  </a:t>
             </a:r>
           </a:p>
           <a:p>
@@ -5206,21 +5248,7 @@
                 <a:latin typeface="Times"/>
                 <a:cs typeface="Times"/>
               </a:rPr>
-              <a:t>You have 10 seconds remaining in the break</a:t>
-            </a:r>
-            <a:r>
-              <a:rPr lang="en-US" sz="3000" dirty="0" smtClean="0">
-                <a:latin typeface="Times"/>
-                <a:cs typeface="Times"/>
-              </a:rPr>
-              <a:t>. Please be as still as possible. </a:t>
-            </a:r>
-            <a:r>
-              <a:rPr lang="en-US" sz="3000" dirty="0" smtClean="0">
-                <a:latin typeface="Times"/>
-                <a:cs typeface="Times"/>
-              </a:rPr>
-              <a:t>The task will resume automatically… </a:t>
+              <a:t>You have 10 seconds remaining in the break. Please be as still as possible. The task will resume automatically… </a:t>
             </a:r>
           </a:p>
           <a:p>
@@ -5301,14 +5329,14 @@
                 <a:latin typeface="Times"/>
                 <a:cs typeface="Times"/>
               </a:rPr>
-              <a:t>right </a:t>
+              <a:t>right middle </a:t>
             </a:r>
             <a:r>
               <a:rPr lang="en-US" sz="3000" dirty="0">
                 <a:latin typeface="Times"/>
                 <a:cs typeface="Times"/>
               </a:rPr>
-              <a:t>index finger. </a:t>
+              <a:t>finger. </a:t>
             </a:r>
             <a:r>
               <a:rPr lang="en-US" sz="3000" u="sng" dirty="0">
@@ -5336,35 +5364,28 @@
                 <a:latin typeface="Times"/>
                 <a:cs typeface="Times"/>
               </a:rPr>
-              <a:t>direct your</a:t>
+              <a:t>direct your </a:t>
+            </a:r>
+            <a:r>
+              <a:rPr lang="en-US" sz="3000" u="sng" dirty="0">
+                <a:latin typeface="Times"/>
+                <a:cs typeface="Times"/>
+              </a:rPr>
+              <a:t>attention to only your </a:t>
             </a:r>
             <a:r>
               <a:rPr lang="en-US" sz="3000" u="sng" dirty="0" smtClean="0">
                 <a:latin typeface="Times"/>
                 <a:cs typeface="Times"/>
               </a:rPr>
-              <a:t> </a:t>
+              <a:t>right middle </a:t>
             </a:r>
             <a:r>
               <a:rPr lang="en-US" sz="3000" u="sng" dirty="0">
                 <a:latin typeface="Times"/>
                 <a:cs typeface="Times"/>
               </a:rPr>
-              <a:t>attention to only your </a:t>
-            </a:r>
-            <a:r>
-              <a:rPr lang="en-US" sz="3000" u="sng" dirty="0" smtClean="0">
-                <a:latin typeface="Times"/>
-                <a:cs typeface="Times"/>
-              </a:rPr>
-              <a:t>right </a:t>
-            </a:r>
-            <a:r>
-              <a:rPr lang="en-US" sz="3000" u="sng" dirty="0">
-                <a:latin typeface="Times"/>
-                <a:cs typeface="Times"/>
-              </a:rPr>
-              <a:t>index finger</a:t>
+              <a:t>finger</a:t>
             </a:r>
             <a:r>
               <a:rPr lang="en-US" sz="3000" u="sng" dirty="0" smtClean="0">
@@ -5429,7 +5450,7 @@
         </p:blipFill>
         <p:spPr>
           <a:xfrm>
-            <a:off x="6060351" y="1709777"/>
+            <a:off x="6737671" y="1625112"/>
             <a:ext cx="1745892" cy="1658599"/>
           </a:xfrm>
           <a:prstGeom prst="rect">
@@ -6473,7 +6494,7 @@
                 <a:latin typeface="Times"/>
                 <a:cs typeface="Times"/>
               </a:rPr>
-              <a:t>task or if you need further clarification on what to do. Next we will calculate your touch detection thresholds for your left and right index fingers. </a:t>
+              <a:t>task or if you need further clarification on what to do. Next we will calculate your touch detection thresholds for your left and right middle fingers. </a:t>
             </a:r>
             <a:endParaRPr lang="en-US" sz="3000" dirty="0">
               <a:latin typeface="Times"/>
@@ -6594,21 +6615,49 @@
                 <a:latin typeface="Times"/>
                 <a:cs typeface="Times"/>
               </a:rPr>
-              <a:t>left index finger only</a:t>
+              <a:t>left </a:t>
+            </a:r>
+            <a:r>
+              <a:rPr lang="en-US" sz="3000" u="sng" dirty="0" smtClean="0">
+                <a:latin typeface="Times"/>
+                <a:cs typeface="Times"/>
+              </a:rPr>
+              <a:t>middle </a:t>
+            </a:r>
+            <a:r>
+              <a:rPr lang="en-US" sz="3000" u="sng" dirty="0">
+                <a:latin typeface="Times"/>
+                <a:cs typeface="Times"/>
+              </a:rPr>
+              <a:t>finger only</a:t>
             </a:r>
             <a:r>
               <a:rPr lang="en-US" sz="3000" dirty="0">
                 <a:latin typeface="Times"/>
                 <a:cs typeface="Times"/>
               </a:rPr>
-              <a:t>. This is done in order to calculate how well you are able to perceive touches on your left index finger. This is known as your </a:t>
+              <a:t>. This is done in order to calculate how well you are able to perceive touches on your left </a:t>
             </a:r>
             <a:r>
               <a:rPr lang="en-US" sz="3000" dirty="0" smtClean="0">
                 <a:latin typeface="Times"/>
                 <a:cs typeface="Times"/>
               </a:rPr>
-              <a:t>detection </a:t>
+              <a:t>middle </a:t>
+            </a:r>
+            <a:r>
+              <a:rPr lang="en-US" sz="3000" dirty="0">
+                <a:latin typeface="Times"/>
+                <a:cs typeface="Times"/>
+              </a:rPr>
+              <a:t>finger. This is </a:t>
+            </a:r>
+            <a:r>
+              <a:rPr lang="en-US" sz="3000" dirty="0" smtClean="0">
+                <a:latin typeface="Times"/>
+                <a:cs typeface="Times"/>
+              </a:rPr>
+              <a:t>your detection </a:t>
             </a:r>
             <a:r>
               <a:rPr lang="en-US" sz="3000" dirty="0">

</xml_diff>